<commit_message>
Update PowerPoint slides and remove superfluous deploy script
</commit_message>
<xml_diff>
--- a/docs/Introduction to Continuous Integration and Deployment with Jenkins.pptx
+++ b/docs/Introduction to Continuous Integration and Deployment with Jenkins.pptx
@@ -5,10 +5,10 @@
     <p:sldMasterId id="2147483648" r:id="rId2"/>
   </p:sldMasterIdLst>
   <p:notesMasterIdLst>
-    <p:notesMasterId r:id="rId18"/>
+    <p:notesMasterId r:id="rId19"/>
   </p:notesMasterIdLst>
   <p:handoutMasterIdLst>
-    <p:handoutMasterId r:id="rId19"/>
+    <p:handoutMasterId r:id="rId20"/>
   </p:handoutMasterIdLst>
   <p:sldIdLst>
     <p:sldId id="265" r:id="rId3"/>
@@ -19,18 +19,19 @@
     <p:sldId id="322" r:id="rId8"/>
     <p:sldId id="323" r:id="rId9"/>
     <p:sldId id="324" r:id="rId10"/>
-    <p:sldId id="326" r:id="rId11"/>
-    <p:sldId id="325" r:id="rId12"/>
-    <p:sldId id="330" r:id="rId13"/>
-    <p:sldId id="327" r:id="rId14"/>
-    <p:sldId id="328" r:id="rId15"/>
-    <p:sldId id="329" r:id="rId16"/>
-    <p:sldId id="317" r:id="rId17"/>
+    <p:sldId id="331" r:id="rId11"/>
+    <p:sldId id="326" r:id="rId12"/>
+    <p:sldId id="325" r:id="rId13"/>
+    <p:sldId id="330" r:id="rId14"/>
+    <p:sldId id="327" r:id="rId15"/>
+    <p:sldId id="328" r:id="rId16"/>
+    <p:sldId id="329" r:id="rId17"/>
+    <p:sldId id="317" r:id="rId18"/>
   </p:sldIdLst>
   <p:sldSz cx="12188825" cy="6858000"/>
   <p:notesSz cx="6858000" cy="9144000"/>
   <p:custDataLst>
-    <p:tags r:id="rId20"/>
+    <p:tags r:id="rId21"/>
   </p:custDataLst>
   <p:defaultTextStyle>
     <a:defPPr>
@@ -231,7 +232,7 @@
           <a:p>
             <a:fld id="{59088EAF-6ECA-4616-85EF-35AA19C641F3}" type="datetimeFigureOut">
               <a:rPr lang="en-US"/>
-              <a:t>3/20/2015</a:t>
+              <a:t>6/16/2015</a:t>
             </a:fld>
             <a:endParaRPr/>
           </a:p>
@@ -396,7 +397,7 @@
           <a:p>
             <a:fld id="{3ABD2D7A-D230-4F91-BD59-0A39C2703BA8}" type="datetimeFigureOut">
               <a:rPr lang="en-US"/>
-              <a:t>3/20/2015</a:t>
+              <a:t>6/16/2015</a:t>
             </a:fld>
             <a:endParaRPr/>
           </a:p>
@@ -998,7 +999,7 @@
           <a:p>
             <a:fld id="{03F41C87-7AD9-4845-A077-840E4A0F3F06}" type="datetimeFigureOut">
               <a:rPr lang="en-US"/>
-              <a:t>3/20/2015</a:t>
+              <a:t>6/16/2015</a:t>
             </a:fld>
             <a:endParaRPr/>
           </a:p>
@@ -1197,7 +1198,7 @@
           <a:p>
             <a:fld id="{03F41C87-7AD9-4845-A077-840E4A0F3F06}" type="datetimeFigureOut">
               <a:rPr lang="en-US"/>
-              <a:t>3/20/2015</a:t>
+              <a:t>6/16/2015</a:t>
             </a:fld>
             <a:endParaRPr/>
           </a:p>
@@ -1393,7 +1394,7 @@
           <a:p>
             <a:fld id="{03F41C87-7AD9-4845-A077-840E4A0F3F06}" type="datetimeFigureOut">
               <a:rPr lang="en-US"/>
-              <a:t>3/20/2015</a:t>
+              <a:t>6/16/2015</a:t>
             </a:fld>
             <a:endParaRPr/>
           </a:p>
@@ -1680,7 +1681,7 @@
           <a:p>
             <a:fld id="{03F41C87-7AD9-4845-A077-840E4A0F3F06}" type="datetimeFigureOut">
               <a:rPr lang="en-US"/>
-              <a:t>3/20/2015</a:t>
+              <a:t>6/16/2015</a:t>
             </a:fld>
             <a:endParaRPr/>
           </a:p>
@@ -1991,7 +1992,7 @@
           <a:p>
             <a:fld id="{03F41C87-7AD9-4845-A077-840E4A0F3F06}" type="datetimeFigureOut">
               <a:rPr lang="en-US"/>
-              <a:t>3/20/2015</a:t>
+              <a:t>6/16/2015</a:t>
             </a:fld>
             <a:endParaRPr/>
           </a:p>
@@ -2454,7 +2455,7 @@
           <a:p>
             <a:fld id="{03F41C87-7AD9-4845-A077-840E4A0F3F06}" type="datetimeFigureOut">
               <a:rPr lang="en-US"/>
-              <a:t>3/20/2015</a:t>
+              <a:t>6/16/2015</a:t>
             </a:fld>
             <a:endParaRPr/>
           </a:p>
@@ -2591,7 +2592,7 @@
           <a:p>
             <a:fld id="{03F41C87-7AD9-4845-A077-840E4A0F3F06}" type="datetimeFigureOut">
               <a:rPr lang="en-US"/>
-              <a:t>3/20/2015</a:t>
+              <a:t>6/16/2015</a:t>
             </a:fld>
             <a:endParaRPr/>
           </a:p>
@@ -2713,7 +2714,7 @@
           <a:p>
             <a:fld id="{03F41C87-7AD9-4845-A077-840E4A0F3F06}" type="datetimeFigureOut">
               <a:rPr lang="en-US"/>
-              <a:t>3/20/2015</a:t>
+              <a:t>6/16/2015</a:t>
             </a:fld>
             <a:endParaRPr/>
           </a:p>
@@ -3042,7 +3043,7 @@
           <a:p>
             <a:fld id="{03F41C87-7AD9-4845-A077-840E4A0F3F06}" type="datetimeFigureOut">
               <a:rPr lang="en-US"/>
-              <a:t>3/20/2015</a:t>
+              <a:t>6/16/2015</a:t>
             </a:fld>
             <a:endParaRPr/>
           </a:p>
@@ -3361,7 +3362,7 @@
             <a:fld id="{03F41C87-7AD9-4845-A077-840E4A0F3F06}" type="datetimeFigureOut">
               <a:rPr lang="en-US"/>
               <a:pPr/>
-              <a:t>3/20/2015</a:t>
+              <a:t>6/16/2015</a:t>
             </a:fld>
             <a:endParaRPr/>
           </a:p>
@@ -3604,7 +3605,7 @@
             <a:fld id="{03F41C87-7AD9-4845-A077-840E4A0F3F06}" type="datetimeFigureOut">
               <a:rPr lang="en-US"/>
               <a:pPr/>
-              <a:t>3/20/2015</a:t>
+              <a:t>6/16/2015</a:t>
             </a:fld>
             <a:endParaRPr/>
           </a:p>
@@ -4160,41 +4161,18 @@
       </p:grpSpPr>
       <p:sp>
         <p:nvSpPr>
-          <p:cNvPr id="2" name="Title 1"/>
+          <p:cNvPr id="4" name="Title 1"/>
           <p:cNvSpPr>
             <a:spLocks noGrp="1"/>
           </p:cNvSpPr>
           <p:nvPr>
             <p:ph type="title"/>
-          </p:nvPr>
-        </p:nvSpPr>
-        <p:spPr/>
-        <p:txBody>
-          <a:bodyPr/>
-          <a:lstStyle/>
-          <a:p>
-            <a:r>
-              <a:rPr lang="en-US" dirty="0" smtClean="0"/>
-              <a:t>Jenkins</a:t>
-            </a:r>
-            <a:endParaRPr lang="en-US" dirty="0"/>
-          </a:p>
-        </p:txBody>
-      </p:sp>
-      <p:sp>
-        <p:nvSpPr>
-          <p:cNvPr id="3" name="Text Placeholder 2"/>
-          <p:cNvSpPr>
-            <a:spLocks noGrp="1"/>
-          </p:cNvSpPr>
-          <p:nvPr>
-            <p:ph type="body" idx="1"/>
           </p:nvPr>
         </p:nvSpPr>
         <p:spPr>
           <a:xfrm>
-            <a:off x="1522411" y="1524000"/>
-            <a:ext cx="4416552" cy="533400"/>
+            <a:off x="457200" y="1428750"/>
+            <a:ext cx="8229600" cy="1315641"/>
           </a:xfrm>
         </p:spPr>
         <p:txBody>
@@ -4203,7 +4181,7 @@
           <a:p>
             <a:r>
               <a:rPr lang="en-US" dirty="0" smtClean="0"/>
-              <a:t>Features</a:t>
+              <a:t>Jenkins </a:t>
             </a:r>
             <a:endParaRPr lang="en-US" dirty="0"/>
           </a:p>
@@ -4211,55 +4189,42 @@
       </p:sp>
       <p:sp>
         <p:nvSpPr>
-          <p:cNvPr id="4" name="Content Placeholder 3"/>
-          <p:cNvSpPr>
-            <a:spLocks noGrp="1"/>
-          </p:cNvSpPr>
-          <p:nvPr>
-            <p:ph sz="half" idx="2"/>
+          <p:cNvPr id="5" name="Text Placeholder 2"/>
+          <p:cNvSpPr>
+            <a:spLocks noGrp="1"/>
+          </p:cNvSpPr>
+          <p:nvPr>
+            <p:ph type="body" idx="1"/>
           </p:nvPr>
         </p:nvSpPr>
         <p:spPr>
           <a:xfrm>
-            <a:off x="1522410" y="2057400"/>
-            <a:ext cx="9601201" cy="4267200"/>
+            <a:off x="458597" y="2768997"/>
+            <a:ext cx="8226806" cy="1125140"/>
           </a:xfrm>
         </p:spPr>
         <p:txBody>
-          <a:bodyPr>
-            <a:normAutofit/>
-          </a:bodyPr>
+          <a:bodyPr/>
           <a:lstStyle/>
           <a:p>
             <a:r>
               <a:rPr lang="en-US" dirty="0" smtClean="0"/>
-              <a:t>Easy Installation</a:t>
+              <a:t>Continuous Integration Server</a:t>
             </a:r>
           </a:p>
           <a:p>
             <a:r>
               <a:rPr lang="en-US" dirty="0" smtClean="0"/>
-              <a:t>Easy Configuration</a:t>
-            </a:r>
-          </a:p>
-          <a:p>
-            <a:r>
-              <a:rPr lang="en-US" dirty="0" smtClean="0"/>
-              <a:t>Integrates with pretty much everything</a:t>
-            </a:r>
-          </a:p>
-          <a:p>
-            <a:r>
-              <a:rPr lang="en-US" dirty="0" smtClean="0"/>
-              <a:t>Open  Source</a:t>
-            </a:r>
+              <a:t>http://www.Jenkins-ci.org</a:t>
+            </a:r>
+            <a:endParaRPr lang="en-US" dirty="0"/>
           </a:p>
         </p:txBody>
       </p:sp>
     </p:spTree>
     <p:extLst>
       <p:ext uri="{BB962C8B-B14F-4D97-AF65-F5344CB8AC3E}">
-        <p14:creationId xmlns:p14="http://schemas.microsoft.com/office/powerpoint/2010/main" val="3372172544"/>
+        <p14:creationId xmlns:p14="http://schemas.microsoft.com/office/powerpoint/2010/main" val="4001341590"/>
       </p:ext>
     </p:extLst>
   </p:cSld>
@@ -4300,18 +4265,41 @@
       </p:grpSpPr>
       <p:sp>
         <p:nvSpPr>
-          <p:cNvPr id="4" name="Title 1"/>
+          <p:cNvPr id="2" name="Title 1"/>
           <p:cNvSpPr>
             <a:spLocks noGrp="1"/>
           </p:cNvSpPr>
           <p:nvPr>
             <p:ph type="title"/>
+          </p:nvPr>
+        </p:nvSpPr>
+        <p:spPr/>
+        <p:txBody>
+          <a:bodyPr/>
+          <a:lstStyle/>
+          <a:p>
+            <a:r>
+              <a:rPr lang="en-US" dirty="0" smtClean="0"/>
+              <a:t>Jenkins</a:t>
+            </a:r>
+            <a:endParaRPr lang="en-US" dirty="0"/>
+          </a:p>
+        </p:txBody>
+      </p:sp>
+      <p:sp>
+        <p:nvSpPr>
+          <p:cNvPr id="3" name="Text Placeholder 2"/>
+          <p:cNvSpPr>
+            <a:spLocks noGrp="1"/>
+          </p:cNvSpPr>
+          <p:nvPr>
+            <p:ph type="body" idx="1"/>
           </p:nvPr>
         </p:nvSpPr>
         <p:spPr>
           <a:xfrm>
-            <a:off x="457200" y="1428750"/>
-            <a:ext cx="8229600" cy="1315641"/>
+            <a:off x="1522411" y="1524000"/>
+            <a:ext cx="4416552" cy="533400"/>
           </a:xfrm>
         </p:spPr>
         <p:txBody>
@@ -4320,7 +4308,7 @@
           <a:p>
             <a:r>
               <a:rPr lang="en-US" dirty="0" smtClean="0"/>
-              <a:t>Demo</a:t>
+              <a:t>Features</a:t>
             </a:r>
             <a:endParaRPr lang="en-US" dirty="0"/>
           </a:p>
@@ -4328,44 +4316,55 @@
       </p:sp>
       <p:sp>
         <p:nvSpPr>
-          <p:cNvPr id="5" name="Text Placeholder 2"/>
-          <p:cNvSpPr>
-            <a:spLocks noGrp="1"/>
-          </p:cNvSpPr>
-          <p:nvPr>
-            <p:ph type="body" idx="1"/>
+          <p:cNvPr id="4" name="Content Placeholder 3"/>
+          <p:cNvSpPr>
+            <a:spLocks noGrp="1"/>
+          </p:cNvSpPr>
+          <p:nvPr>
+            <p:ph sz="half" idx="2"/>
           </p:nvPr>
         </p:nvSpPr>
         <p:spPr>
           <a:xfrm>
-            <a:off x="458597" y="2768997"/>
-            <a:ext cx="8226806" cy="1125140"/>
+            <a:off x="1522410" y="2057400"/>
+            <a:ext cx="9601201" cy="4267200"/>
           </a:xfrm>
         </p:spPr>
         <p:txBody>
-          <a:bodyPr/>
+          <a:bodyPr>
+            <a:normAutofit/>
+          </a:bodyPr>
           <a:lstStyle/>
           <a:p>
             <a:r>
               <a:rPr lang="en-US" dirty="0" smtClean="0"/>
-              <a:t>Enough </a:t>
-            </a:r>
-            <a:r>
-              <a:rPr lang="en-US" dirty="0" err="1" smtClean="0"/>
-              <a:t>yappin</a:t>
-            </a:r>
+              <a:t>Easy Installation</a:t>
+            </a:r>
+          </a:p>
+          <a:p>
             <a:r>
               <a:rPr lang="en-US" dirty="0" smtClean="0"/>
-              <a:t>’, let’s see stuff go!</a:t>
-            </a:r>
-            <a:endParaRPr lang="en-US" dirty="0"/>
+              <a:t>Easy Configuration</a:t>
+            </a:r>
+          </a:p>
+          <a:p>
+            <a:r>
+              <a:rPr lang="en-US" dirty="0" smtClean="0"/>
+              <a:t>Integrates with pretty much everything</a:t>
+            </a:r>
+          </a:p>
+          <a:p>
+            <a:r>
+              <a:rPr lang="en-US" dirty="0" smtClean="0"/>
+              <a:t>Open  Source</a:t>
+            </a:r>
           </a:p>
         </p:txBody>
       </p:sp>
     </p:spTree>
     <p:extLst>
       <p:ext uri="{BB962C8B-B14F-4D97-AF65-F5344CB8AC3E}">
-        <p14:creationId xmlns:p14="http://schemas.microsoft.com/office/powerpoint/2010/main" val="544245025"/>
+        <p14:creationId xmlns:p14="http://schemas.microsoft.com/office/powerpoint/2010/main" val="3372172544"/>
       </p:ext>
     </p:extLst>
   </p:cSld>
@@ -4426,7 +4425,7 @@
           <a:p>
             <a:r>
               <a:rPr lang="en-US" dirty="0" smtClean="0"/>
-              <a:t>Continuous Deployment</a:t>
+              <a:t>Demo</a:t>
             </a:r>
             <a:endParaRPr lang="en-US" dirty="0"/>
           </a:p>
@@ -4454,7 +4453,15 @@
           <a:p>
             <a:r>
               <a:rPr lang="en-US" dirty="0" smtClean="0"/>
-              <a:t>Techniques to improve the process of software delivery</a:t>
+              <a:t>Enough </a:t>
+            </a:r>
+            <a:r>
+              <a:rPr lang="en-US" dirty="0" err="1" smtClean="0"/>
+              <a:t>yappin</a:t>
+            </a:r>
+            <a:r>
+              <a:rPr lang="en-US" dirty="0" smtClean="0"/>
+              <a:t>’, let’s see stuff go!</a:t>
             </a:r>
             <a:endParaRPr lang="en-US" dirty="0"/>
           </a:p>
@@ -4463,7 +4470,7 @@
     </p:spTree>
     <p:extLst>
       <p:ext uri="{BB962C8B-B14F-4D97-AF65-F5344CB8AC3E}">
-        <p14:creationId xmlns:p14="http://schemas.microsoft.com/office/powerpoint/2010/main" val="2351198423"/>
+        <p14:creationId xmlns:p14="http://schemas.microsoft.com/office/powerpoint/2010/main" val="544245025"/>
       </p:ext>
     </p:extLst>
   </p:cSld>
@@ -4504,7 +4511,7 @@
       </p:grpSpPr>
       <p:sp>
         <p:nvSpPr>
-          <p:cNvPr id="2" name="Title 1"/>
+          <p:cNvPr id="4" name="Title 1"/>
           <p:cNvSpPr>
             <a:spLocks noGrp="1"/>
           </p:cNvSpPr>
@@ -4512,14 +4519,19 @@
             <p:ph type="title"/>
           </p:nvPr>
         </p:nvSpPr>
-        <p:spPr/>
+        <p:spPr>
+          <a:xfrm>
+            <a:off x="457200" y="1428750"/>
+            <a:ext cx="8229600" cy="1315641"/>
+          </a:xfrm>
+        </p:spPr>
         <p:txBody>
           <a:bodyPr/>
           <a:lstStyle/>
           <a:p>
             <a:r>
               <a:rPr lang="en-US" dirty="0" smtClean="0"/>
-              <a:t>Continuous Delivery</a:t>
+              <a:t>Continuous Deployment</a:t>
             </a:r>
             <a:endParaRPr lang="en-US" dirty="0"/>
           </a:p>
@@ -4527,60 +4539,27 @@
       </p:sp>
       <p:sp>
         <p:nvSpPr>
-          <p:cNvPr id="3" name="Content Placeholder 2"/>
-          <p:cNvSpPr>
-            <a:spLocks noGrp="1"/>
-          </p:cNvSpPr>
-          <p:nvPr>
-            <p:ph idx="1"/>
-          </p:nvPr>
-        </p:nvSpPr>
-        <p:spPr/>
+          <p:cNvPr id="5" name="Text Placeholder 2"/>
+          <p:cNvSpPr>
+            <a:spLocks noGrp="1"/>
+          </p:cNvSpPr>
+          <p:nvPr>
+            <p:ph type="body" idx="1"/>
+          </p:nvPr>
+        </p:nvSpPr>
+        <p:spPr>
+          <a:xfrm>
+            <a:off x="458597" y="2768997"/>
+            <a:ext cx="8226806" cy="1125140"/>
+          </a:xfrm>
+        </p:spPr>
         <p:txBody>
           <a:bodyPr/>
           <a:lstStyle/>
           <a:p>
-            <a:pPr marL="0" indent="0">
-              <a:buNone/>
-            </a:pPr>
             <a:r>
               <a:rPr lang="en-US" dirty="0" smtClean="0"/>
-              <a:t>Techniques</a:t>
-            </a:r>
-            <a:endParaRPr lang="en-US" dirty="0"/>
-          </a:p>
-          <a:p>
-            <a:r>
-              <a:rPr lang="en-US" dirty="0" smtClean="0"/>
-              <a:t>Manual</a:t>
-            </a:r>
-            <a:endParaRPr lang="en-US" dirty="0"/>
-          </a:p>
-          <a:p>
-            <a:r>
-              <a:rPr lang="en-US" dirty="0" smtClean="0"/>
-              <a:t>Blue-Green Deployment</a:t>
-            </a:r>
-          </a:p>
-          <a:p>
-            <a:r>
-              <a:rPr lang="en-US" dirty="0" smtClean="0"/>
-              <a:t>Automated </a:t>
-            </a:r>
-            <a:r>
-              <a:rPr lang="en-US" dirty="0" err="1" smtClean="0"/>
-              <a:t>Infrastructre</a:t>
-            </a:r>
-            <a:r>
-              <a:rPr lang="en-US" dirty="0" smtClean="0"/>
-              <a:t> as a Service</a:t>
-            </a:r>
-            <a:endParaRPr lang="en-US" dirty="0"/>
-          </a:p>
-          <a:p>
-            <a:r>
-              <a:rPr lang="en-US" dirty="0" smtClean="0"/>
-              <a:t>Platform as a Service</a:t>
+              <a:t>Techniques to improve the process of software delivery</a:t>
             </a:r>
             <a:endParaRPr lang="en-US" dirty="0"/>
           </a:p>
@@ -4589,7 +4568,7 @@
     </p:spTree>
     <p:extLst>
       <p:ext uri="{BB962C8B-B14F-4D97-AF65-F5344CB8AC3E}">
-        <p14:creationId xmlns:p14="http://schemas.microsoft.com/office/powerpoint/2010/main" val="3980690473"/>
+        <p14:creationId xmlns:p14="http://schemas.microsoft.com/office/powerpoint/2010/main" val="2351198423"/>
       </p:ext>
     </p:extLst>
   </p:cSld>
@@ -4645,6 +4624,140 @@
           <a:p>
             <a:r>
               <a:rPr lang="en-US" dirty="0" smtClean="0"/>
+              <a:t>Continuous Delivery</a:t>
+            </a:r>
+            <a:endParaRPr lang="en-US" dirty="0"/>
+          </a:p>
+        </p:txBody>
+      </p:sp>
+      <p:sp>
+        <p:nvSpPr>
+          <p:cNvPr id="3" name="Content Placeholder 2"/>
+          <p:cNvSpPr>
+            <a:spLocks noGrp="1"/>
+          </p:cNvSpPr>
+          <p:nvPr>
+            <p:ph idx="1"/>
+          </p:nvPr>
+        </p:nvSpPr>
+        <p:spPr/>
+        <p:txBody>
+          <a:bodyPr/>
+          <a:lstStyle/>
+          <a:p>
+            <a:pPr marL="0" indent="0">
+              <a:buNone/>
+            </a:pPr>
+            <a:r>
+              <a:rPr lang="en-US" dirty="0" smtClean="0"/>
+              <a:t>Techniques</a:t>
+            </a:r>
+            <a:endParaRPr lang="en-US" dirty="0"/>
+          </a:p>
+          <a:p>
+            <a:r>
+              <a:rPr lang="en-US" dirty="0" smtClean="0"/>
+              <a:t>Manual</a:t>
+            </a:r>
+            <a:endParaRPr lang="en-US" dirty="0"/>
+          </a:p>
+          <a:p>
+            <a:r>
+              <a:rPr lang="en-US" dirty="0" smtClean="0"/>
+              <a:t>Blue-Green Deployment</a:t>
+            </a:r>
+          </a:p>
+          <a:p>
+            <a:r>
+              <a:rPr lang="en-US" dirty="0" smtClean="0"/>
+              <a:t>Automated </a:t>
+            </a:r>
+            <a:r>
+              <a:rPr lang="en-US" dirty="0" smtClean="0"/>
+              <a:t>Infrastructure </a:t>
+            </a:r>
+            <a:r>
+              <a:rPr lang="en-US" dirty="0" smtClean="0"/>
+              <a:t>as a Service</a:t>
+            </a:r>
+            <a:endParaRPr lang="en-US" dirty="0"/>
+          </a:p>
+          <a:p>
+            <a:r>
+              <a:rPr lang="en-US" dirty="0" smtClean="0"/>
+              <a:t>Platform as </a:t>
+            </a:r>
+            <a:r>
+              <a:rPr lang="en-US" smtClean="0"/>
+              <a:t>a </a:t>
+            </a:r>
+            <a:r>
+              <a:rPr lang="en-US" smtClean="0"/>
+              <a:t>Service</a:t>
+            </a:r>
+            <a:endParaRPr lang="en-US" dirty="0"/>
+          </a:p>
+        </p:txBody>
+      </p:sp>
+    </p:spTree>
+    <p:extLst>
+      <p:ext uri="{BB962C8B-B14F-4D97-AF65-F5344CB8AC3E}">
+        <p14:creationId xmlns:p14="http://schemas.microsoft.com/office/powerpoint/2010/main" val="3980690473"/>
+      </p:ext>
+    </p:extLst>
+  </p:cSld>
+  <p:clrMapOvr>
+    <a:masterClrMapping/>
+  </p:clrMapOvr>
+  <mc:AlternateContent xmlns:mc="http://schemas.openxmlformats.org/markup-compatibility/2006" xmlns:p14="http://schemas.microsoft.com/office/powerpoint/2010/main">
+    <mc:Choice Requires="p14">
+      <p:transition spd="med" p14:dur="700">
+        <p:fade/>
+      </p:transition>
+    </mc:Choice>
+    <mc:Fallback xmlns="">
+      <p:transition spd="med">
+        <p:fade/>
+      </p:transition>
+    </mc:Fallback>
+  </mc:AlternateContent>
+</p:sld>
+</file>
+
+<file path=ppt/slides/slide15.xml><?xml version="1.0" encoding="utf-8"?>
+<p:sld xmlns:a="http://schemas.openxmlformats.org/drawingml/2006/main" xmlns:r="http://schemas.openxmlformats.org/officeDocument/2006/relationships" xmlns:p="http://schemas.openxmlformats.org/presentationml/2006/main">
+  <p:cSld>
+    <p:spTree>
+      <p:nvGrpSpPr>
+        <p:cNvPr id="1" name=""/>
+        <p:cNvGrpSpPr/>
+        <p:nvPr/>
+      </p:nvGrpSpPr>
+      <p:grpSpPr>
+        <a:xfrm>
+          <a:off x="0" y="0"/>
+          <a:ext cx="0" cy="0"/>
+          <a:chOff x="0" y="0"/>
+          <a:chExt cx="0" cy="0"/>
+        </a:xfrm>
+      </p:grpSpPr>
+      <p:sp>
+        <p:nvSpPr>
+          <p:cNvPr id="2" name="Title 1"/>
+          <p:cNvSpPr>
+            <a:spLocks noGrp="1"/>
+          </p:cNvSpPr>
+          <p:nvPr>
+            <p:ph type="title"/>
+          </p:nvPr>
+        </p:nvSpPr>
+        <p:spPr/>
+        <p:txBody>
+          <a:bodyPr/>
+          <a:lstStyle/>
+          <a:p>
+            <a:r>
+              <a:rPr lang="en-US" dirty="0" smtClean="0"/>
               <a:t>Questions</a:t>
             </a:r>
             <a:endParaRPr lang="en-US" b="1" dirty="0"/>
@@ -4689,7 +4802,7 @@
         </p:nvSpPr>
         <p:spPr>
           <a:xfrm>
-            <a:off x="1674812" y="2426731"/>
+            <a:off x="1674812" y="2819400"/>
             <a:ext cx="4033476" cy="369332"/>
           </a:xfrm>
           <a:prstGeom prst="rect">
@@ -4719,7 +4832,7 @@
         </p:nvSpPr>
         <p:spPr>
           <a:xfrm>
-            <a:off x="1674812" y="2828328"/>
+            <a:off x="1674812" y="3220997"/>
             <a:ext cx="3636701" cy="369332"/>
           </a:xfrm>
           <a:prstGeom prst="rect">
@@ -4737,6 +4850,36 @@
               <a:rPr lang="en-US" dirty="0"/>
               <a:t>https://twitter.com/JasonvanBrackel</a:t>
             </a:r>
+          </a:p>
+        </p:txBody>
+      </p:sp>
+      <p:sp>
+        <p:nvSpPr>
+          <p:cNvPr id="6" name="TextBox 5"/>
+          <p:cNvSpPr txBox="1"/>
+          <p:nvPr/>
+        </p:nvSpPr>
+        <p:spPr>
+          <a:xfrm>
+            <a:off x="1674812" y="2450068"/>
+            <a:ext cx="2894062" cy="369332"/>
+          </a:xfrm>
+          <a:prstGeom prst="rect">
+            <a:avLst/>
+          </a:prstGeom>
+          <a:noFill/>
+        </p:spPr>
+        <p:txBody>
+          <a:bodyPr wrap="none" rtlCol="0">
+            <a:spAutoFit/>
+          </a:bodyPr>
+          <a:lstStyle/>
+          <a:p>
+            <a:r>
+              <a:rPr lang="en-US" dirty="0" smtClean="0"/>
+              <a:t>jvanbrackel@apprenda.com</a:t>
+            </a:r>
+            <a:endParaRPr lang="en-US" dirty="0"/>
           </a:p>
         </p:txBody>
       </p:sp>
@@ -4765,7 +4908,7 @@
 </p:sld>
 </file>
 
-<file path=ppt/slides/slide15.xml><?xml version="1.0" encoding="utf-8"?>
+<file path=ppt/slides/slide16.xml><?xml version="1.0" encoding="utf-8"?>
 <p:sld xmlns:a="http://schemas.openxmlformats.org/drawingml/2006/main" xmlns:r="http://schemas.openxmlformats.org/officeDocument/2006/relationships" xmlns:p="http://schemas.openxmlformats.org/presentationml/2006/main">
   <p:cSld>
     <p:spTree>
@@ -5017,18 +5160,25 @@
   <p:clrMapOvr>
     <a:masterClrMapping/>
   </p:clrMapOvr>
-  <mc:AlternateContent xmlns:mc="http://schemas.openxmlformats.org/markup-compatibility/2006">
-    <mc:Choice xmlns:p14="http://schemas.microsoft.com/office/powerpoint/2010/main" Requires="p14">
+  <mc:AlternateContent xmlns:mc="http://schemas.openxmlformats.org/markup-compatibility/2006" xmlns:p14="http://schemas.microsoft.com/office/powerpoint/2010/main">
+    <mc:Choice Requires="p14">
       <p:transition spd="med" p14:dur="700">
         <p:fade/>
       </p:transition>
     </mc:Choice>
-    <mc:Fallback>
+    <mc:Fallback xmlns="">
       <p:transition spd="med">
         <p:fade/>
       </p:transition>
     </mc:Fallback>
   </mc:AlternateContent>
+  <p:timing>
+    <p:tnLst>
+      <p:par>
+        <p:cTn id="1" dur="indefinite" restart="never" nodeType="tmRoot"/>
+      </p:par>
+    </p:tnLst>
+  </p:timing>
 </p:sld>
 </file>
 
@@ -5091,14 +5241,12 @@
               <a:rPr lang="en-US" dirty="0" smtClean="0"/>
               <a:t>Introduce you to Continuous Integration</a:t>
             </a:r>
-            <a:endParaRPr lang="en-US" dirty="0" smtClean="0"/>
           </a:p>
           <a:p>
             <a:r>
               <a:rPr lang="en-US" dirty="0" smtClean="0"/>
               <a:t>Introduce you to Selenium</a:t>
             </a:r>
-            <a:endParaRPr lang="en-US" dirty="0" smtClean="0"/>
           </a:p>
           <a:p>
             <a:r>
@@ -5256,6 +5404,13 @@
       </p:transition>
     </mc:Fallback>
   </mc:AlternateContent>
+  <p:timing>
+    <p:tnLst>
+      <p:par>
+        <p:cTn id="1" dur="indefinite" restart="never" nodeType="tmRoot"/>
+      </p:par>
+    </p:tnLst>
+  </p:timing>
 </p:sld>
 </file>
 
@@ -5361,18 +5516,25 @@
   <p:clrMapOvr>
     <a:masterClrMapping/>
   </p:clrMapOvr>
-  <mc:AlternateContent xmlns:mc="http://schemas.openxmlformats.org/markup-compatibility/2006">
-    <mc:Choice xmlns:p14="http://schemas.microsoft.com/office/powerpoint/2010/main" Requires="p14">
+  <mc:AlternateContent xmlns:mc="http://schemas.openxmlformats.org/markup-compatibility/2006" xmlns:p14="http://schemas.microsoft.com/office/powerpoint/2010/main">
+    <mc:Choice Requires="p14">
       <p:transition spd="med" p14:dur="700">
         <p:fade/>
       </p:transition>
     </mc:Choice>
-    <mc:Fallback>
+    <mc:Fallback xmlns="">
       <p:transition spd="med">
         <p:fade/>
       </p:transition>
     </mc:Fallback>
   </mc:AlternateContent>
+  <p:timing>
+    <p:tnLst>
+      <p:par>
+        <p:cTn id="1" dur="indefinite" restart="never" nodeType="tmRoot"/>
+      </p:par>
+    </p:tnLst>
+  </p:timing>
 </p:sld>
 </file>
 
@@ -5566,6 +5728,13 @@
       </p:transition>
     </mc:Fallback>
   </mc:AlternateContent>
+  <p:timing>
+    <p:tnLst>
+      <p:par>
+        <p:cTn id="1" dur="indefinite" restart="never" nodeType="tmRoot"/>
+      </p:par>
+    </p:tnLst>
+  </p:timing>
 </p:sld>
 </file>
 
@@ -5696,11 +5865,11 @@
           </a:p>
           <a:p>
             <a:r>
-              <a:rPr lang="en-US" dirty="0"/>
-              <a:t>Make Your Build Self-Testing (</a:t>
-            </a:r>
-            <a:r>
-              <a:rPr lang="en-US" dirty="0" err="1"/>
+              <a:rPr lang="en-US" dirty="0" smtClean="0"/>
+              <a:t>Automate the Testing(</a:t>
+            </a:r>
+            <a:r>
+              <a:rPr lang="en-US" dirty="0" err="1" smtClean="0"/>
               <a:t>Nunit</a:t>
             </a:r>
             <a:r>
@@ -5727,13 +5896,42 @@
           <a:p>
             <a:r>
               <a:rPr lang="en-US" dirty="0"/>
-              <a:t>Everyone Commits To the Mainline Every Day</a:t>
-            </a:r>
-          </a:p>
-          <a:p>
+              <a:t>Everyone Commits To the </a:t>
+            </a:r>
+            <a:r>
+              <a:rPr lang="en-US" dirty="0" smtClean="0"/>
+              <a:t>mainline </a:t>
+            </a:r>
             <a:r>
               <a:rPr lang="en-US" dirty="0"/>
-              <a:t>Every Commit Should Build the Mainline on an Integration Machine</a:t>
+              <a:t>Every </a:t>
+            </a:r>
+            <a:r>
+              <a:rPr lang="en-US" dirty="0" smtClean="0"/>
+              <a:t>Day(</a:t>
+            </a:r>
+            <a:r>
+              <a:rPr lang="en-US" dirty="0" err="1" smtClean="0"/>
+              <a:t>ish</a:t>
+            </a:r>
+            <a:r>
+              <a:rPr lang="en-US" dirty="0" smtClean="0"/>
+              <a:t>)</a:t>
+            </a:r>
+            <a:endParaRPr lang="en-US" dirty="0"/>
+          </a:p>
+          <a:p>
+            <a:r>
+              <a:rPr lang="en-US" dirty="0"/>
+              <a:t>Every Commit Should Build the </a:t>
+            </a:r>
+            <a:r>
+              <a:rPr lang="en-US" dirty="0" smtClean="0"/>
+              <a:t>mainline </a:t>
+            </a:r>
+            <a:r>
+              <a:rPr lang="en-US" dirty="0"/>
+              <a:t>on an Integration Machine</a:t>
             </a:r>
           </a:p>
           <a:p>
@@ -5932,18 +6130,41 @@
       </p:grpSpPr>
       <p:sp>
         <p:nvSpPr>
-          <p:cNvPr id="4" name="Title 1"/>
+          <p:cNvPr id="2" name="Title 1"/>
           <p:cNvSpPr>
             <a:spLocks noGrp="1"/>
           </p:cNvSpPr>
           <p:nvPr>
             <p:ph type="title"/>
+          </p:nvPr>
+        </p:nvSpPr>
+        <p:spPr/>
+        <p:txBody>
+          <a:bodyPr/>
+          <a:lstStyle/>
+          <a:p>
+            <a:r>
+              <a:rPr lang="en-US" dirty="0" err="1" smtClean="0"/>
+              <a:t>Selenuim</a:t>
+            </a:r>
+            <a:endParaRPr lang="en-US" dirty="0"/>
+          </a:p>
+        </p:txBody>
+      </p:sp>
+      <p:sp>
+        <p:nvSpPr>
+          <p:cNvPr id="3" name="Text Placeholder 2"/>
+          <p:cNvSpPr>
+            <a:spLocks noGrp="1"/>
+          </p:cNvSpPr>
+          <p:nvPr>
+            <p:ph type="body" idx="1"/>
           </p:nvPr>
         </p:nvSpPr>
         <p:spPr>
           <a:xfrm>
-            <a:off x="457200" y="1428750"/>
-            <a:ext cx="8229600" cy="1315641"/>
+            <a:off x="1522411" y="1524000"/>
+            <a:ext cx="4416552" cy="533400"/>
           </a:xfrm>
         </p:spPr>
         <p:txBody>
@@ -5952,7 +6173,7 @@
           <a:p>
             <a:r>
               <a:rPr lang="en-US" dirty="0" smtClean="0"/>
-              <a:t>Jenkins </a:t>
+              <a:t>Features</a:t>
             </a:r>
             <a:endParaRPr lang="en-US" dirty="0"/>
           </a:p>
@@ -5960,42 +6181,62 @@
       </p:sp>
       <p:sp>
         <p:nvSpPr>
-          <p:cNvPr id="5" name="Text Placeholder 2"/>
-          <p:cNvSpPr>
-            <a:spLocks noGrp="1"/>
-          </p:cNvSpPr>
-          <p:nvPr>
-            <p:ph type="body" idx="1"/>
+          <p:cNvPr id="4" name="Content Placeholder 3"/>
+          <p:cNvSpPr>
+            <a:spLocks noGrp="1"/>
+          </p:cNvSpPr>
+          <p:nvPr>
+            <p:ph sz="half" idx="2"/>
           </p:nvPr>
         </p:nvSpPr>
         <p:spPr>
           <a:xfrm>
-            <a:off x="458597" y="2768997"/>
-            <a:ext cx="8226806" cy="1125140"/>
+            <a:off x="1522410" y="2057400"/>
+            <a:ext cx="9601201" cy="4267200"/>
           </a:xfrm>
         </p:spPr>
         <p:txBody>
-          <a:bodyPr/>
+          <a:bodyPr>
+            <a:normAutofit/>
+          </a:bodyPr>
           <a:lstStyle/>
           <a:p>
             <a:r>
               <a:rPr lang="en-US" dirty="0" smtClean="0"/>
-              <a:t>Continuous Integration Server</a:t>
-            </a:r>
+              <a:t>It automates browsers</a:t>
+            </a:r>
+            <a:endParaRPr lang="en-US" dirty="0" smtClean="0"/>
           </a:p>
           <a:p>
             <a:r>
               <a:rPr lang="en-US" dirty="0" smtClean="0"/>
-              <a:t>http://www.Jenkins-ci.org</a:t>
-            </a:r>
-            <a:endParaRPr lang="en-US" dirty="0"/>
+              <a:t>Simple Object Oriented API</a:t>
+            </a:r>
+            <a:endParaRPr lang="en-US" dirty="0" smtClean="0"/>
+          </a:p>
+          <a:p>
+            <a:r>
+              <a:rPr lang="en-US" dirty="0" smtClean="0"/>
+              <a:t>Integrates with pretty much </a:t>
+            </a:r>
+            <a:r>
+              <a:rPr lang="en-US" dirty="0" smtClean="0"/>
+              <a:t>any browser you can think of.</a:t>
+            </a:r>
+            <a:endParaRPr lang="en-US" dirty="0" smtClean="0"/>
+          </a:p>
+          <a:p>
+            <a:r>
+              <a:rPr lang="en-US" dirty="0" smtClean="0"/>
+              <a:t>Open  Source</a:t>
+            </a:r>
           </a:p>
         </p:txBody>
       </p:sp>
     </p:spTree>
     <p:extLst>
       <p:ext uri="{BB962C8B-B14F-4D97-AF65-F5344CB8AC3E}">
-        <p14:creationId xmlns:p14="http://schemas.microsoft.com/office/powerpoint/2010/main" val="4001341590"/>
+        <p14:creationId xmlns:p14="http://schemas.microsoft.com/office/powerpoint/2010/main" val="4090749104"/>
       </p:ext>
     </p:extLst>
   </p:cSld>

</xml_diff>

<commit_message>
Add changes from last code camp
</commit_message>
<xml_diff>
--- a/docs/Introduction to Continuous Integration and Deployment with Jenkins.pptx
+++ b/docs/Introduction to Continuous Integration and Deployment with Jenkins.pptx
@@ -22,9 +22,9 @@
     <p:sldId id="331" r:id="rId11"/>
     <p:sldId id="326" r:id="rId12"/>
     <p:sldId id="325" r:id="rId13"/>
-    <p:sldId id="330" r:id="rId14"/>
-    <p:sldId id="327" r:id="rId15"/>
-    <p:sldId id="328" r:id="rId16"/>
+    <p:sldId id="327" r:id="rId14"/>
+    <p:sldId id="328" r:id="rId15"/>
+    <p:sldId id="330" r:id="rId16"/>
     <p:sldId id="332" r:id="rId17"/>
     <p:sldId id="333" r:id="rId18"/>
     <p:sldId id="329" r:id="rId19"/>
@@ -234,7 +234,7 @@
           <a:p>
             <a:fld id="{59088EAF-6ECA-4616-85EF-35AA19C641F3}" type="datetimeFigureOut">
               <a:rPr lang="en-US"/>
-              <a:t>10/9/2015</a:t>
+              <a:t>10/22/2016</a:t>
             </a:fld>
             <a:endParaRPr/>
           </a:p>
@@ -399,7 +399,7 @@
           <a:p>
             <a:fld id="{3ABD2D7A-D230-4F91-BD59-0A39C2703BA8}" type="datetimeFigureOut">
               <a:rPr lang="en-US"/>
-              <a:t>10/9/2015</a:t>
+              <a:t>10/22/2016</a:t>
             </a:fld>
             <a:endParaRPr/>
           </a:p>
@@ -731,7 +731,7 @@
           </a:lstStyle>
           <a:p>
             <a:r>
-              <a:rPr lang="en-US" smtClean="0"/>
+              <a:rPr lang="en-US"/>
               <a:t>Click to edit Master title style</a:t>
             </a:r>
             <a:endParaRPr/>
@@ -853,7 +853,7 @@
           </a:lstStyle>
           <a:p>
             <a:r>
-              <a:rPr lang="en-US" smtClean="0"/>
+              <a:rPr lang="en-US"/>
               <a:t>Click to edit Master subtitle style</a:t>
             </a:r>
             <a:endParaRPr/>
@@ -882,13 +882,6 @@
       </p:transition>
     </mc:Fallback>
   </mc:AlternateContent>
-  <p:timing>
-    <p:tnLst>
-      <p:par>
-        <p:cTn id="1" dur="indefinite" restart="never" nodeType="tmRoot"/>
-      </p:par>
-    </p:tnLst>
-  </p:timing>
 </p:sldLayout>
 </file>
 
@@ -925,7 +918,7 @@
           <a:lstStyle/>
           <a:p>
             <a:r>
-              <a:rPr lang="en-US" smtClean="0"/>
+              <a:rPr lang="en-US"/>
               <a:t>Click to edit Master title style</a:t>
             </a:r>
             <a:endParaRPr/>
@@ -949,35 +942,35 @@
           <a:p>
             <a:pPr lvl="0"/>
             <a:r>
-              <a:rPr lang="en-US" smtClean="0"/>
+              <a:rPr lang="en-US"/>
               <a:t>Click to edit Master text styles</a:t>
             </a:r>
           </a:p>
           <a:p>
             <a:pPr lvl="1"/>
             <a:r>
-              <a:rPr lang="en-US" smtClean="0"/>
+              <a:rPr lang="en-US"/>
               <a:t>Second level</a:t>
             </a:r>
           </a:p>
           <a:p>
             <a:pPr lvl="2"/>
             <a:r>
-              <a:rPr lang="en-US" smtClean="0"/>
+              <a:rPr lang="en-US"/>
               <a:t>Third level</a:t>
             </a:r>
           </a:p>
           <a:p>
             <a:pPr lvl="3"/>
             <a:r>
-              <a:rPr lang="en-US" smtClean="0"/>
+              <a:rPr lang="en-US"/>
               <a:t>Fourth level</a:t>
             </a:r>
           </a:p>
           <a:p>
             <a:pPr lvl="4"/>
             <a:r>
-              <a:rPr lang="en-US" smtClean="0"/>
+              <a:rPr lang="en-US"/>
               <a:t>Fifth level</a:t>
             </a:r>
             <a:endParaRPr/>
@@ -1001,7 +994,7 @@
           <a:p>
             <a:fld id="{03F41C87-7AD9-4845-A077-840E4A0F3F06}" type="datetimeFigureOut">
               <a:rPr lang="en-US"/>
-              <a:t>10/9/2015</a:t>
+              <a:t>10/22/2016</a:t>
             </a:fld>
             <a:endParaRPr/>
           </a:p>
@@ -1071,13 +1064,6 @@
       </p:transition>
     </mc:Fallback>
   </mc:AlternateContent>
-  <p:timing>
-    <p:tnLst>
-      <p:par>
-        <p:cTn id="1" dur="indefinite" restart="never" nodeType="tmRoot"/>
-      </p:par>
-    </p:tnLst>
-  </p:timing>
 </p:sldLayout>
 </file>
 
@@ -1119,7 +1105,7 @@
           <a:lstStyle/>
           <a:p>
             <a:r>
-              <a:rPr lang="en-US" smtClean="0"/>
+              <a:rPr lang="en-US"/>
               <a:t>Click to edit Master title style</a:t>
             </a:r>
             <a:endParaRPr/>
@@ -1148,35 +1134,35 @@
           <a:p>
             <a:pPr lvl="0"/>
             <a:r>
-              <a:rPr lang="en-US" smtClean="0"/>
+              <a:rPr lang="en-US"/>
               <a:t>Click to edit Master text styles</a:t>
             </a:r>
           </a:p>
           <a:p>
             <a:pPr lvl="1"/>
             <a:r>
-              <a:rPr lang="en-US" smtClean="0"/>
+              <a:rPr lang="en-US"/>
               <a:t>Second level</a:t>
             </a:r>
           </a:p>
           <a:p>
             <a:pPr lvl="2"/>
             <a:r>
-              <a:rPr lang="en-US" smtClean="0"/>
+              <a:rPr lang="en-US"/>
               <a:t>Third level</a:t>
             </a:r>
           </a:p>
           <a:p>
             <a:pPr lvl="3"/>
             <a:r>
-              <a:rPr lang="en-US" smtClean="0"/>
+              <a:rPr lang="en-US"/>
               <a:t>Fourth level</a:t>
             </a:r>
           </a:p>
           <a:p>
             <a:pPr lvl="4"/>
             <a:r>
-              <a:rPr lang="en-US" smtClean="0"/>
+              <a:rPr lang="en-US"/>
               <a:t>Fifth level</a:t>
             </a:r>
             <a:endParaRPr/>
@@ -1200,7 +1186,7 @@
           <a:p>
             <a:fld id="{03F41C87-7AD9-4845-A077-840E4A0F3F06}" type="datetimeFigureOut">
               <a:rPr lang="en-US"/>
-              <a:t>10/9/2015</a:t>
+              <a:t>10/22/2016</a:t>
             </a:fld>
             <a:endParaRPr/>
           </a:p>
@@ -1270,13 +1256,6 @@
       </p:transition>
     </mc:Fallback>
   </mc:AlternateContent>
-  <p:timing>
-    <p:tnLst>
-      <p:par>
-        <p:cTn id="1" dur="indefinite" restart="never" nodeType="tmRoot"/>
-      </p:par>
-    </p:tnLst>
-  </p:timing>
 </p:sldLayout>
 </file>
 
@@ -1313,7 +1292,7 @@
           <a:lstStyle/>
           <a:p>
             <a:r>
-              <a:rPr lang="en-US" smtClean="0"/>
+              <a:rPr lang="en-US"/>
               <a:t>Click to edit Master title style</a:t>
             </a:r>
             <a:endParaRPr/>
@@ -1344,35 +1323,35 @@
           <a:p>
             <a:pPr lvl="0"/>
             <a:r>
-              <a:rPr lang="en-US" smtClean="0"/>
+              <a:rPr lang="en-US"/>
               <a:t>Click to edit Master text styles</a:t>
             </a:r>
           </a:p>
           <a:p>
             <a:pPr lvl="1"/>
             <a:r>
-              <a:rPr lang="en-US" smtClean="0"/>
+              <a:rPr lang="en-US"/>
               <a:t>Second level</a:t>
             </a:r>
           </a:p>
           <a:p>
             <a:pPr lvl="2"/>
             <a:r>
-              <a:rPr lang="en-US" smtClean="0"/>
+              <a:rPr lang="en-US"/>
               <a:t>Third level</a:t>
             </a:r>
           </a:p>
           <a:p>
             <a:pPr lvl="3"/>
             <a:r>
-              <a:rPr lang="en-US" smtClean="0"/>
+              <a:rPr lang="en-US"/>
               <a:t>Fourth level</a:t>
             </a:r>
           </a:p>
           <a:p>
             <a:pPr lvl="4"/>
             <a:r>
-              <a:rPr lang="en-US" smtClean="0"/>
+              <a:rPr lang="en-US"/>
               <a:t>Fifth level</a:t>
             </a:r>
             <a:endParaRPr/>
@@ -1396,7 +1375,7 @@
           <a:p>
             <a:fld id="{03F41C87-7AD9-4845-A077-840E4A0F3F06}" type="datetimeFigureOut">
               <a:rPr lang="en-US"/>
-              <a:t>10/9/2015</a:t>
+              <a:t>10/22/2016</a:t>
             </a:fld>
             <a:endParaRPr/>
           </a:p>
@@ -1466,13 +1445,6 @@
       </p:transition>
     </mc:Fallback>
   </mc:AlternateContent>
-  <p:timing>
-    <p:tnLst>
-      <p:par>
-        <p:cTn id="1" dur="indefinite" restart="never" nodeType="tmRoot"/>
-      </p:par>
-    </p:tnLst>
-  </p:timing>
 </p:sldLayout>
 </file>
 
@@ -1537,7 +1509,7 @@
           </a:lstStyle>
           <a:p>
             <a:r>
-              <a:rPr lang="en-US" smtClean="0"/>
+              <a:rPr lang="en-US"/>
               <a:t>Click to edit Master title style</a:t>
             </a:r>
             <a:endParaRPr/>
@@ -1660,7 +1632,7 @@
           <a:p>
             <a:pPr lvl="0"/>
             <a:r>
-              <a:rPr lang="en-US" smtClean="0"/>
+              <a:rPr lang="en-US"/>
               <a:t>Click to edit Master text styles</a:t>
             </a:r>
           </a:p>
@@ -1683,7 +1655,7 @@
           <a:p>
             <a:fld id="{03F41C87-7AD9-4845-A077-840E4A0F3F06}" type="datetimeFigureOut">
               <a:rPr lang="en-US"/>
-              <a:t>10/9/2015</a:t>
+              <a:t>10/22/2016</a:t>
             </a:fld>
             <a:endParaRPr/>
           </a:p>
@@ -1753,13 +1725,6 @@
       </p:transition>
     </mc:Fallback>
   </mc:AlternateContent>
-  <p:timing>
-    <p:tnLst>
-      <p:par>
-        <p:cTn id="1" dur="indefinite" restart="never" nodeType="tmRoot"/>
-      </p:par>
-    </p:tnLst>
-  </p:timing>
 </p:sldLayout>
 </file>
 
@@ -1796,7 +1761,7 @@
           <a:lstStyle/>
           <a:p>
             <a:r>
-              <a:rPr lang="en-US" smtClean="0"/>
+              <a:rPr lang="en-US"/>
               <a:t>Click to edit Master title style</a:t>
             </a:r>
             <a:endParaRPr/>
@@ -1855,35 +1820,35 @@
           <a:p>
             <a:pPr lvl="0"/>
             <a:r>
-              <a:rPr lang="en-US" smtClean="0"/>
+              <a:rPr lang="en-US"/>
               <a:t>Click to edit Master text styles</a:t>
             </a:r>
           </a:p>
           <a:p>
             <a:pPr lvl="1"/>
             <a:r>
-              <a:rPr lang="en-US" smtClean="0"/>
+              <a:rPr lang="en-US"/>
               <a:t>Second level</a:t>
             </a:r>
           </a:p>
           <a:p>
             <a:pPr lvl="2"/>
             <a:r>
-              <a:rPr lang="en-US" smtClean="0"/>
+              <a:rPr lang="en-US"/>
               <a:t>Third level</a:t>
             </a:r>
           </a:p>
           <a:p>
             <a:pPr lvl="3"/>
             <a:r>
-              <a:rPr lang="en-US" smtClean="0"/>
+              <a:rPr lang="en-US"/>
               <a:t>Fourth level</a:t>
             </a:r>
           </a:p>
           <a:p>
             <a:pPr lvl="4"/>
             <a:r>
-              <a:rPr lang="en-US" smtClean="0"/>
+              <a:rPr lang="en-US"/>
               <a:t>Fifth level</a:t>
             </a:r>
             <a:endParaRPr/>
@@ -1942,35 +1907,35 @@
           <a:p>
             <a:pPr lvl="0"/>
             <a:r>
-              <a:rPr lang="en-US" smtClean="0"/>
+              <a:rPr lang="en-US"/>
               <a:t>Click to edit Master text styles</a:t>
             </a:r>
           </a:p>
           <a:p>
             <a:pPr lvl="1"/>
             <a:r>
-              <a:rPr lang="en-US" smtClean="0"/>
+              <a:rPr lang="en-US"/>
               <a:t>Second level</a:t>
             </a:r>
           </a:p>
           <a:p>
             <a:pPr lvl="2"/>
             <a:r>
-              <a:rPr lang="en-US" smtClean="0"/>
+              <a:rPr lang="en-US"/>
               <a:t>Third level</a:t>
             </a:r>
           </a:p>
           <a:p>
             <a:pPr lvl="3"/>
             <a:r>
-              <a:rPr lang="en-US" smtClean="0"/>
+              <a:rPr lang="en-US"/>
               <a:t>Fourth level</a:t>
             </a:r>
           </a:p>
           <a:p>
             <a:pPr lvl="4"/>
             <a:r>
-              <a:rPr lang="en-US" smtClean="0"/>
+              <a:rPr lang="en-US"/>
               <a:t>Fifth level</a:t>
             </a:r>
             <a:endParaRPr/>
@@ -1994,7 +1959,7 @@
           <a:p>
             <a:fld id="{03F41C87-7AD9-4845-A077-840E4A0F3F06}" type="datetimeFigureOut">
               <a:rPr lang="en-US"/>
-              <a:t>10/9/2015</a:t>
+              <a:t>10/22/2016</a:t>
             </a:fld>
             <a:endParaRPr/>
           </a:p>
@@ -2064,13 +2029,6 @@
       </p:transition>
     </mc:Fallback>
   </mc:AlternateContent>
-  <p:timing>
-    <p:tnLst>
-      <p:par>
-        <p:cTn id="1" dur="indefinite" restart="never" nodeType="tmRoot"/>
-      </p:par>
-    </p:tnLst>
-  </p:timing>
 </p:sldLayout>
 </file>
 
@@ -2111,7 +2069,7 @@
           </a:lstStyle>
           <a:p>
             <a:r>
-              <a:rPr lang="en-US" smtClean="0"/>
+              <a:rPr lang="en-US"/>
               <a:t>Click to edit Master title style</a:t>
             </a:r>
             <a:endParaRPr/>
@@ -2186,7 +2144,7 @@
           <a:p>
             <a:pPr lvl="0"/>
             <a:r>
-              <a:rPr lang="en-US" smtClean="0"/>
+              <a:rPr lang="en-US"/>
               <a:t>Click to edit Master text styles</a:t>
             </a:r>
           </a:p>
@@ -2244,35 +2202,35 @@
           <a:p>
             <a:pPr lvl="0"/>
             <a:r>
-              <a:rPr lang="en-US" smtClean="0"/>
+              <a:rPr lang="en-US"/>
               <a:t>Click to edit Master text styles</a:t>
             </a:r>
           </a:p>
           <a:p>
             <a:pPr lvl="1"/>
             <a:r>
-              <a:rPr lang="en-US" smtClean="0"/>
+              <a:rPr lang="en-US"/>
               <a:t>Second level</a:t>
             </a:r>
           </a:p>
           <a:p>
             <a:pPr lvl="2"/>
             <a:r>
-              <a:rPr lang="en-US" smtClean="0"/>
+              <a:rPr lang="en-US"/>
               <a:t>Third level</a:t>
             </a:r>
           </a:p>
           <a:p>
             <a:pPr lvl="3"/>
             <a:r>
-              <a:rPr lang="en-US" smtClean="0"/>
+              <a:rPr lang="en-US"/>
               <a:t>Fourth level</a:t>
             </a:r>
           </a:p>
           <a:p>
             <a:pPr lvl="4"/>
             <a:r>
-              <a:rPr lang="en-US" smtClean="0"/>
+              <a:rPr lang="en-US"/>
               <a:t>Fifth level</a:t>
             </a:r>
             <a:endParaRPr/>
@@ -2347,7 +2305,7 @@
           <a:p>
             <a:pPr lvl="0"/>
             <a:r>
-              <a:rPr lang="en-US" smtClean="0"/>
+              <a:rPr lang="en-US"/>
               <a:t>Click to edit Master text styles</a:t>
             </a:r>
           </a:p>
@@ -2405,35 +2363,35 @@
           <a:p>
             <a:pPr lvl="0"/>
             <a:r>
-              <a:rPr lang="en-US" smtClean="0"/>
+              <a:rPr lang="en-US"/>
               <a:t>Click to edit Master text styles</a:t>
             </a:r>
           </a:p>
           <a:p>
             <a:pPr lvl="1"/>
             <a:r>
-              <a:rPr lang="en-US" smtClean="0"/>
+              <a:rPr lang="en-US"/>
               <a:t>Second level</a:t>
             </a:r>
           </a:p>
           <a:p>
             <a:pPr lvl="2"/>
             <a:r>
-              <a:rPr lang="en-US" smtClean="0"/>
+              <a:rPr lang="en-US"/>
               <a:t>Third level</a:t>
             </a:r>
           </a:p>
           <a:p>
             <a:pPr lvl="3"/>
             <a:r>
-              <a:rPr lang="en-US" smtClean="0"/>
+              <a:rPr lang="en-US"/>
               <a:t>Fourth level</a:t>
             </a:r>
           </a:p>
           <a:p>
             <a:pPr lvl="4"/>
             <a:r>
-              <a:rPr lang="en-US" smtClean="0"/>
+              <a:rPr lang="en-US"/>
               <a:t>Fifth level</a:t>
             </a:r>
             <a:endParaRPr/>
@@ -2457,7 +2415,7 @@
           <a:p>
             <a:fld id="{03F41C87-7AD9-4845-A077-840E4A0F3F06}" type="datetimeFigureOut">
               <a:rPr lang="en-US"/>
-              <a:t>10/9/2015</a:t>
+              <a:t>10/22/2016</a:t>
             </a:fld>
             <a:endParaRPr/>
           </a:p>
@@ -2527,13 +2485,6 @@
       </p:transition>
     </mc:Fallback>
   </mc:AlternateContent>
-  <p:timing>
-    <p:tnLst>
-      <p:par>
-        <p:cTn id="1" dur="indefinite" restart="never" nodeType="tmRoot"/>
-      </p:par>
-    </p:tnLst>
-  </p:timing>
 </p:sldLayout>
 </file>
 
@@ -2570,7 +2521,7 @@
           <a:lstStyle/>
           <a:p>
             <a:r>
-              <a:rPr lang="en-US" smtClean="0"/>
+              <a:rPr lang="en-US"/>
               <a:t>Click to edit Master title style</a:t>
             </a:r>
             <a:endParaRPr/>
@@ -2594,7 +2545,7 @@
           <a:p>
             <a:fld id="{03F41C87-7AD9-4845-A077-840E4A0F3F06}" type="datetimeFigureOut">
               <a:rPr lang="en-US"/>
-              <a:t>10/9/2015</a:t>
+              <a:t>10/22/2016</a:t>
             </a:fld>
             <a:endParaRPr/>
           </a:p>
@@ -2664,13 +2615,6 @@
       </p:transition>
     </mc:Fallback>
   </mc:AlternateContent>
-  <p:timing>
-    <p:tnLst>
-      <p:par>
-        <p:cTn id="1" dur="indefinite" restart="never" nodeType="tmRoot"/>
-      </p:par>
-    </p:tnLst>
-  </p:timing>
 </p:sldLayout>
 </file>
 
@@ -2716,7 +2660,7 @@
           <a:p>
             <a:fld id="{03F41C87-7AD9-4845-A077-840E4A0F3F06}" type="datetimeFigureOut">
               <a:rPr lang="en-US"/>
-              <a:t>10/9/2015</a:t>
+              <a:t>10/22/2016</a:t>
             </a:fld>
             <a:endParaRPr/>
           </a:p>
@@ -2786,13 +2730,6 @@
       </p:transition>
     </mc:Fallback>
   </mc:AlternateContent>
-  <p:timing>
-    <p:tnLst>
-      <p:par>
-        <p:cTn id="1" dur="indefinite" restart="never" nodeType="tmRoot"/>
-      </p:par>
-    </p:tnLst>
-  </p:timing>
 </p:sldLayout>
 </file>
 
@@ -2861,7 +2798,7 @@
           </a:lstStyle>
           <a:p>
             <a:r>
-              <a:rPr lang="en-US" smtClean="0"/>
+              <a:rPr lang="en-US"/>
               <a:t>Click to edit Master title style</a:t>
             </a:r>
             <a:endParaRPr/>
@@ -2920,35 +2857,35 @@
           <a:p>
             <a:pPr lvl="0"/>
             <a:r>
-              <a:rPr lang="en-US" smtClean="0"/>
+              <a:rPr lang="en-US"/>
               <a:t>Click to edit Master text styles</a:t>
             </a:r>
           </a:p>
           <a:p>
             <a:pPr lvl="1"/>
             <a:r>
-              <a:rPr lang="en-US" smtClean="0"/>
+              <a:rPr lang="en-US"/>
               <a:t>Second level</a:t>
             </a:r>
           </a:p>
           <a:p>
             <a:pPr lvl="2"/>
             <a:r>
-              <a:rPr lang="en-US" smtClean="0"/>
+              <a:rPr lang="en-US"/>
               <a:t>Third level</a:t>
             </a:r>
           </a:p>
           <a:p>
             <a:pPr lvl="3"/>
             <a:r>
-              <a:rPr lang="en-US" smtClean="0"/>
+              <a:rPr lang="en-US"/>
               <a:t>Fourth level</a:t>
             </a:r>
           </a:p>
           <a:p>
             <a:pPr lvl="4"/>
             <a:r>
-              <a:rPr lang="en-US" smtClean="0"/>
+              <a:rPr lang="en-US"/>
               <a:t>Fifth level</a:t>
             </a:r>
             <a:endParaRPr/>
@@ -3022,7 +2959,7 @@
           <a:p>
             <a:pPr lvl="0"/>
             <a:r>
-              <a:rPr lang="en-US" smtClean="0"/>
+              <a:rPr lang="en-US"/>
               <a:t>Click to edit Master text styles</a:t>
             </a:r>
           </a:p>
@@ -3045,7 +2982,7 @@
           <a:p>
             <a:fld id="{03F41C87-7AD9-4845-A077-840E4A0F3F06}" type="datetimeFigureOut">
               <a:rPr lang="en-US"/>
-              <a:t>10/9/2015</a:t>
+              <a:t>10/22/2016</a:t>
             </a:fld>
             <a:endParaRPr/>
           </a:p>
@@ -3115,13 +3052,6 @@
       </p:transition>
     </mc:Fallback>
   </mc:AlternateContent>
-  <p:timing>
-    <p:tnLst>
-      <p:par>
-        <p:cTn id="1" dur="indefinite" restart="never" nodeType="tmRoot"/>
-      </p:par>
-    </p:tnLst>
-  </p:timing>
 </p:sldLayout>
 </file>
 
@@ -3225,7 +3155,7 @@
           </a:lstStyle>
           <a:p>
             <a:r>
-              <a:rPr lang="en-US" smtClean="0"/>
+              <a:rPr lang="en-US"/>
               <a:t>Click icon to add picture</a:t>
             </a:r>
             <a:endParaRPr/>
@@ -3266,7 +3196,7 @@
           </a:lstStyle>
           <a:p>
             <a:r>
-              <a:rPr lang="en-US" smtClean="0"/>
+              <a:rPr lang="en-US"/>
               <a:t>Click to edit Master title style</a:t>
             </a:r>
             <a:endParaRPr/>
@@ -3340,7 +3270,7 @@
           <a:p>
             <a:pPr lvl="0"/>
             <a:r>
-              <a:rPr lang="en-US" smtClean="0"/>
+              <a:rPr lang="en-US"/>
               <a:t>Click to edit Master text styles</a:t>
             </a:r>
           </a:p>
@@ -3364,7 +3294,7 @@
             <a:fld id="{03F41C87-7AD9-4845-A077-840E4A0F3F06}" type="datetimeFigureOut">
               <a:rPr lang="en-US"/>
               <a:pPr/>
-              <a:t>10/9/2015</a:t>
+              <a:t>10/22/2016</a:t>
             </a:fld>
             <a:endParaRPr/>
           </a:p>
@@ -3435,13 +3365,6 @@
       </p:transition>
     </mc:Fallback>
   </mc:AlternateContent>
-  <p:timing>
-    <p:tnLst>
-      <p:par>
-        <p:cTn id="1" dur="indefinite" restart="never" nodeType="tmRoot"/>
-      </p:par>
-    </p:tnLst>
-  </p:timing>
 </p:sldLayout>
 </file>
 
@@ -3502,7 +3425,7 @@
           <a:lstStyle/>
           <a:p>
             <a:r>
-              <a:rPr lang="en-US" smtClean="0"/>
+              <a:rPr lang="en-US"/>
               <a:t>Click to edit Master title style</a:t>
             </a:r>
             <a:endParaRPr/>
@@ -3536,35 +3459,35 @@
           <a:p>
             <a:pPr lvl="0"/>
             <a:r>
-              <a:rPr lang="en-US" smtClean="0"/>
+              <a:rPr lang="en-US"/>
               <a:t>Click to edit Master text styles</a:t>
             </a:r>
           </a:p>
           <a:p>
             <a:pPr lvl="1"/>
             <a:r>
-              <a:rPr lang="en-US" smtClean="0"/>
+              <a:rPr lang="en-US"/>
               <a:t>Second level</a:t>
             </a:r>
           </a:p>
           <a:p>
             <a:pPr lvl="2"/>
             <a:r>
-              <a:rPr lang="en-US" smtClean="0"/>
+              <a:rPr lang="en-US"/>
               <a:t>Third level</a:t>
             </a:r>
           </a:p>
           <a:p>
             <a:pPr lvl="3"/>
             <a:r>
-              <a:rPr lang="en-US" smtClean="0"/>
+              <a:rPr lang="en-US"/>
               <a:t>Fourth level</a:t>
             </a:r>
           </a:p>
           <a:p>
             <a:pPr lvl="4"/>
             <a:r>
-              <a:rPr lang="en-US" smtClean="0"/>
+              <a:rPr lang="en-US"/>
               <a:t>Fifth level</a:t>
             </a:r>
             <a:endParaRPr dirty="0"/>
@@ -3607,7 +3530,7 @@
             <a:fld id="{03F41C87-7AD9-4845-A077-840E4A0F3F06}" type="datetimeFigureOut">
               <a:rPr lang="en-US"/>
               <a:pPr/>
-              <a:t>10/9/2015</a:t>
+              <a:t>10/22/2016</a:t>
             </a:fld>
             <a:endParaRPr/>
           </a:p>
@@ -3725,13 +3648,6 @@
       </p:transition>
     </mc:Fallback>
   </mc:AlternateContent>
-  <p:timing>
-    <p:tnLst>
-      <p:par>
-        <p:cTn id="1" dur="indefinite" restart="never" nodeType="tmRoot"/>
-      </p:par>
-    </p:tnLst>
-  </p:timing>
   <p:txStyles>
     <p:titleStyle>
       <a:lvl1pPr algn="l" defTabSz="914400" rtl="0" eaLnBrk="1" latinLnBrk="0" hangingPunct="1">
@@ -4086,10 +4002,9 @@
           <a:lstStyle/>
           <a:p>
             <a:r>
-              <a:rPr lang="en-US" dirty="0" smtClean="0"/>
+              <a:rPr lang="en-US" dirty="0"/>
               <a:t>Introduction to Continuous Integration and Deployment with Jenkins</a:t>
             </a:r>
-            <a:endParaRPr lang="en-US" dirty="0"/>
           </a:p>
         </p:txBody>
       </p:sp>
@@ -4134,13 +4049,6 @@
       </p:transition>
     </mc:Fallback>
   </mc:AlternateContent>
-  <p:timing>
-    <p:tnLst>
-      <p:par>
-        <p:cTn id="1" dur="indefinite" restart="never" nodeType="tmRoot"/>
-      </p:par>
-    </p:tnLst>
-  </p:timing>
 </p:sld>
 </file>
 
@@ -4182,10 +4090,9 @@
           <a:lstStyle/>
           <a:p>
             <a:r>
-              <a:rPr lang="en-US" dirty="0" smtClean="0"/>
+              <a:rPr lang="en-US" dirty="0"/>
               <a:t>Jenkins </a:t>
             </a:r>
-            <a:endParaRPr lang="en-US" dirty="0"/>
           </a:p>
         </p:txBody>
       </p:sp>
@@ -4210,16 +4117,15 @@
           <a:lstStyle/>
           <a:p>
             <a:r>
-              <a:rPr lang="en-US" dirty="0" smtClean="0"/>
+              <a:rPr lang="en-US" dirty="0"/>
               <a:t>Continuous Integration Server</a:t>
             </a:r>
           </a:p>
           <a:p>
             <a:r>
-              <a:rPr lang="en-US" dirty="0" smtClean="0"/>
+              <a:rPr lang="en-US" dirty="0"/>
               <a:t>http://www.Jenkins-ci.org</a:t>
             </a:r>
-            <a:endParaRPr lang="en-US" dirty="0"/>
           </a:p>
         </p:txBody>
       </p:sp>
@@ -4281,10 +4187,9 @@
           <a:lstStyle/>
           <a:p>
             <a:r>
-              <a:rPr lang="en-US" dirty="0" smtClean="0"/>
+              <a:rPr lang="en-US" dirty="0"/>
               <a:t>Jenkins</a:t>
             </a:r>
-            <a:endParaRPr lang="en-US" dirty="0"/>
           </a:p>
         </p:txBody>
       </p:sp>
@@ -4309,10 +4214,9 @@
           <a:lstStyle/>
           <a:p>
             <a:r>
-              <a:rPr lang="en-US" dirty="0" smtClean="0"/>
+              <a:rPr lang="en-US" dirty="0"/>
               <a:t>Features</a:t>
             </a:r>
-            <a:endParaRPr lang="en-US" dirty="0"/>
           </a:p>
         </p:txBody>
       </p:sp>
@@ -4339,26 +4243,32 @@
           <a:lstStyle/>
           <a:p>
             <a:r>
-              <a:rPr lang="en-US" dirty="0" smtClean="0"/>
+              <a:rPr lang="en-US" dirty="0"/>
               <a:t>Easy Installation</a:t>
             </a:r>
           </a:p>
           <a:p>
             <a:r>
-              <a:rPr lang="en-US" dirty="0" smtClean="0"/>
+              <a:rPr lang="en-US" dirty="0"/>
               <a:t>Easy Configuration</a:t>
             </a:r>
           </a:p>
           <a:p>
             <a:r>
-              <a:rPr lang="en-US" dirty="0" smtClean="0"/>
+              <a:rPr lang="en-US" dirty="0"/>
               <a:t>Integrates with pretty much everything</a:t>
             </a:r>
           </a:p>
           <a:p>
             <a:r>
-              <a:rPr lang="en-US" dirty="0" smtClean="0"/>
+              <a:rPr lang="en-US" dirty="0"/>
               <a:t>Open  Source</a:t>
+            </a:r>
+          </a:p>
+          <a:p>
+            <a:r>
+              <a:rPr lang="en-US" dirty="0"/>
+              <a:t>It’s a dumb job runner</a:t>
             </a:r>
           </a:p>
         </p:txBody>
@@ -4426,10 +4336,9 @@
           <a:lstStyle/>
           <a:p>
             <a:r>
-              <a:rPr lang="en-US" dirty="0" smtClean="0"/>
-              <a:t>Demo</a:t>
-            </a:r>
-            <a:endParaRPr lang="en-US" dirty="0"/>
+              <a:rPr lang="en-US" dirty="0"/>
+              <a:t>Continuous Deployment</a:t>
+            </a:r>
           </a:p>
         </p:txBody>
       </p:sp>
@@ -4454,25 +4363,16 @@
           <a:lstStyle/>
           <a:p>
             <a:r>
-              <a:rPr lang="en-US" dirty="0" smtClean="0"/>
-              <a:t>Enough </a:t>
-            </a:r>
-            <a:r>
-              <a:rPr lang="en-US" dirty="0" err="1" smtClean="0"/>
-              <a:t>yappin</a:t>
-            </a:r>
-            <a:r>
-              <a:rPr lang="en-US" dirty="0" smtClean="0"/>
-              <a:t>’, let’s see stuff go!</a:t>
-            </a:r>
-            <a:endParaRPr lang="en-US" dirty="0"/>
+              <a:rPr lang="en-US" dirty="0"/>
+              <a:t>Techniques to improve the process of software delivery</a:t>
+            </a:r>
           </a:p>
         </p:txBody>
       </p:sp>
     </p:spTree>
     <p:extLst>
       <p:ext uri="{BB962C8B-B14F-4D97-AF65-F5344CB8AC3E}">
-        <p14:creationId xmlns:p14="http://schemas.microsoft.com/office/powerpoint/2010/main" val="544245025"/>
+        <p14:creationId xmlns:p14="http://schemas.microsoft.com/office/powerpoint/2010/main" val="2351198423"/>
       </p:ext>
     </p:extLst>
   </p:cSld>
@@ -4513,7 +4413,7 @@
       </p:grpSpPr>
       <p:sp>
         <p:nvSpPr>
-          <p:cNvPr id="4" name="Title 1"/>
+          <p:cNvPr id="2" name="Title 1"/>
           <p:cNvSpPr>
             <a:spLocks noGrp="1"/>
           </p:cNvSpPr>
@@ -4521,47 +4421,67 @@
             <p:ph type="title"/>
           </p:nvPr>
         </p:nvSpPr>
-        <p:spPr>
-          <a:xfrm>
-            <a:off x="457200" y="1428750"/>
-            <a:ext cx="8229600" cy="1315641"/>
-          </a:xfrm>
-        </p:spPr>
+        <p:spPr/>
         <p:txBody>
           <a:bodyPr/>
           <a:lstStyle/>
           <a:p>
             <a:r>
-              <a:rPr lang="en-US" dirty="0" smtClean="0"/>
-              <a:t>Continuous Deployment</a:t>
-            </a:r>
-            <a:endParaRPr lang="en-US" dirty="0"/>
-          </a:p>
-        </p:txBody>
-      </p:sp>
-      <p:sp>
-        <p:nvSpPr>
-          <p:cNvPr id="5" name="Text Placeholder 2"/>
-          <p:cNvSpPr>
-            <a:spLocks noGrp="1"/>
-          </p:cNvSpPr>
-          <p:nvPr>
-            <p:ph type="body" idx="1"/>
-          </p:nvPr>
-        </p:nvSpPr>
-        <p:spPr>
-          <a:xfrm>
-            <a:off x="458597" y="2768997"/>
-            <a:ext cx="8226806" cy="1125140"/>
-          </a:xfrm>
-        </p:spPr>
+              <a:rPr lang="en-US" dirty="0"/>
+              <a:t>Continuous Delivery</a:t>
+            </a:r>
+          </a:p>
+        </p:txBody>
+      </p:sp>
+      <p:sp>
+        <p:nvSpPr>
+          <p:cNvPr id="3" name="Content Placeholder 2"/>
+          <p:cNvSpPr>
+            <a:spLocks noGrp="1"/>
+          </p:cNvSpPr>
+          <p:nvPr>
+            <p:ph idx="1"/>
+          </p:nvPr>
+        </p:nvSpPr>
+        <p:spPr/>
         <p:txBody>
           <a:bodyPr/>
           <a:lstStyle/>
           <a:p>
-            <a:r>
-              <a:rPr lang="en-US" dirty="0" smtClean="0"/>
-              <a:t>Techniques to improve the process of software delivery</a:t>
+            <a:pPr marL="0" indent="0">
+              <a:buNone/>
+            </a:pPr>
+            <a:r>
+              <a:rPr lang="en-US" dirty="0"/>
+              <a:t>Techniques</a:t>
+            </a:r>
+          </a:p>
+          <a:p>
+            <a:r>
+              <a:rPr lang="en-US" dirty="0"/>
+              <a:t>Manual</a:t>
+            </a:r>
+          </a:p>
+          <a:p>
+            <a:r>
+              <a:rPr lang="en-US" dirty="0"/>
+              <a:t>Blue-Green Deployment</a:t>
+            </a:r>
+          </a:p>
+          <a:p>
+            <a:r>
+              <a:rPr lang="en-US" dirty="0"/>
+              <a:t>Automated Infrastructure as a Service</a:t>
+            </a:r>
+          </a:p>
+          <a:p>
+            <a:r>
+              <a:rPr lang="en-US" dirty="0"/>
+              <a:t>Platform as </a:t>
+            </a:r>
+            <a:r>
+              <a:rPr lang="en-US"/>
+              <a:t>a Service</a:t>
             </a:r>
             <a:endParaRPr lang="en-US" dirty="0"/>
           </a:p>
@@ -4570,7 +4490,7 @@
     </p:spTree>
     <p:extLst>
       <p:ext uri="{BB962C8B-B14F-4D97-AF65-F5344CB8AC3E}">
-        <p14:creationId xmlns:p14="http://schemas.microsoft.com/office/powerpoint/2010/main" val="2351198423"/>
+        <p14:creationId xmlns:p14="http://schemas.microsoft.com/office/powerpoint/2010/main" val="3980690473"/>
       </p:ext>
     </p:extLst>
   </p:cSld>
@@ -4611,7 +4531,7 @@
       </p:grpSpPr>
       <p:sp>
         <p:nvSpPr>
-          <p:cNvPr id="2" name="Title 1"/>
+          <p:cNvPr id="4" name="Title 1"/>
           <p:cNvSpPr>
             <a:spLocks noGrp="1"/>
           </p:cNvSpPr>
@@ -4619,80 +4539,62 @@
             <p:ph type="title"/>
           </p:nvPr>
         </p:nvSpPr>
-        <p:spPr/>
+        <p:spPr>
+          <a:xfrm>
+            <a:off x="457200" y="1428750"/>
+            <a:ext cx="8229600" cy="1315641"/>
+          </a:xfrm>
+        </p:spPr>
         <p:txBody>
           <a:bodyPr/>
           <a:lstStyle/>
           <a:p>
             <a:r>
-              <a:rPr lang="en-US" dirty="0" smtClean="0"/>
-              <a:t>Continuous Delivery</a:t>
-            </a:r>
-            <a:endParaRPr lang="en-US" dirty="0"/>
-          </a:p>
-        </p:txBody>
-      </p:sp>
-      <p:sp>
-        <p:nvSpPr>
-          <p:cNvPr id="3" name="Content Placeholder 2"/>
-          <p:cNvSpPr>
-            <a:spLocks noGrp="1"/>
-          </p:cNvSpPr>
-          <p:nvPr>
-            <p:ph idx="1"/>
-          </p:nvPr>
-        </p:nvSpPr>
-        <p:spPr/>
+              <a:rPr lang="en-US" dirty="0"/>
+              <a:t>Demo</a:t>
+            </a:r>
+          </a:p>
+        </p:txBody>
+      </p:sp>
+      <p:sp>
+        <p:nvSpPr>
+          <p:cNvPr id="5" name="Text Placeholder 2"/>
+          <p:cNvSpPr>
+            <a:spLocks noGrp="1"/>
+          </p:cNvSpPr>
+          <p:nvPr>
+            <p:ph type="body" idx="1"/>
+          </p:nvPr>
+        </p:nvSpPr>
+        <p:spPr>
+          <a:xfrm>
+            <a:off x="458597" y="2768997"/>
+            <a:ext cx="8226806" cy="1125140"/>
+          </a:xfrm>
+        </p:spPr>
         <p:txBody>
           <a:bodyPr/>
           <a:lstStyle/>
           <a:p>
-            <a:pPr marL="0" indent="0">
-              <a:buNone/>
-            </a:pPr>
-            <a:r>
-              <a:rPr lang="en-US" dirty="0" smtClean="0"/>
-              <a:t>Techniques</a:t>
-            </a:r>
-            <a:endParaRPr lang="en-US" dirty="0"/>
-          </a:p>
-          <a:p>
-            <a:r>
-              <a:rPr lang="en-US" dirty="0" smtClean="0"/>
-              <a:t>Manual</a:t>
-            </a:r>
-            <a:endParaRPr lang="en-US" dirty="0"/>
-          </a:p>
-          <a:p>
-            <a:r>
-              <a:rPr lang="en-US" dirty="0" smtClean="0"/>
-              <a:t>Blue-Green Deployment</a:t>
-            </a:r>
-          </a:p>
-          <a:p>
-            <a:r>
-              <a:rPr lang="en-US" dirty="0" smtClean="0"/>
-              <a:t>Automated Infrastructure as a Service</a:t>
-            </a:r>
-            <a:endParaRPr lang="en-US" dirty="0"/>
-          </a:p>
-          <a:p>
-            <a:r>
-              <a:rPr lang="en-US" dirty="0" smtClean="0"/>
-              <a:t>Platform as </a:t>
-            </a:r>
-            <a:r>
-              <a:rPr lang="en-US" smtClean="0"/>
-              <a:t>a Service</a:t>
-            </a:r>
-            <a:endParaRPr lang="en-US" dirty="0"/>
+            <a:r>
+              <a:rPr lang="en-US" dirty="0"/>
+              <a:t>Enough </a:t>
+            </a:r>
+            <a:r>
+              <a:rPr lang="en-US" dirty="0" err="1"/>
+              <a:t>yappin</a:t>
+            </a:r>
+            <a:r>
+              <a:rPr lang="en-US" dirty="0"/>
+              <a:t>’, let’s see stuff go!</a:t>
+            </a:r>
           </a:p>
         </p:txBody>
       </p:sp>
     </p:spTree>
     <p:extLst>
       <p:ext uri="{BB962C8B-B14F-4D97-AF65-F5344CB8AC3E}">
-        <p14:creationId xmlns:p14="http://schemas.microsoft.com/office/powerpoint/2010/main" val="3980690473"/>
+        <p14:creationId xmlns:p14="http://schemas.microsoft.com/office/powerpoint/2010/main" val="544245025"/>
       </p:ext>
     </p:extLst>
   </p:cSld>
@@ -4752,7 +4654,7 @@
           <a:lstStyle/>
           <a:p>
             <a:r>
-              <a:rPr lang="en-US" dirty="0" err="1" smtClean="0"/>
+              <a:rPr lang="en-US" dirty="0" err="1"/>
               <a:t>NuGet</a:t>
             </a:r>
             <a:endParaRPr lang="en-US" dirty="0"/>
@@ -4780,10 +4682,9 @@
           <a:lstStyle/>
           <a:p>
             <a:r>
-              <a:rPr lang="en-US" dirty="0" smtClean="0"/>
+              <a:rPr lang="en-US" dirty="0"/>
               <a:t>Package Manager Extraordinaire </a:t>
             </a:r>
-            <a:endParaRPr lang="en-US" dirty="0"/>
           </a:p>
         </p:txBody>
       </p:sp>
@@ -4845,7 +4746,7 @@
           <a:lstStyle/>
           <a:p>
             <a:r>
-              <a:rPr lang="en-US" dirty="0" err="1" smtClean="0"/>
+              <a:rPr lang="en-US" dirty="0" err="1"/>
               <a:t>NuGet</a:t>
             </a:r>
             <a:endParaRPr lang="en-US" dirty="0"/>
@@ -4870,110 +4771,95 @@
           <a:lstStyle/>
           <a:p>
             <a:r>
-              <a:rPr lang="en-US" dirty="0" smtClean="0"/>
+              <a:rPr lang="en-US" dirty="0"/>
               <a:t>Register at NuGet.org</a:t>
             </a:r>
           </a:p>
           <a:p>
             <a:pPr lvl="1"/>
             <a:r>
-              <a:rPr lang="en-US" dirty="0" smtClean="0"/>
+              <a:rPr lang="en-US" dirty="0"/>
               <a:t>Or Setup a </a:t>
             </a:r>
             <a:r>
-              <a:rPr lang="en-US" dirty="0" err="1" smtClean="0"/>
+              <a:rPr lang="en-US" dirty="0" err="1"/>
               <a:t>NuGet</a:t>
             </a:r>
             <a:r>
-              <a:rPr lang="en-US" dirty="0" smtClean="0"/>
+              <a:rPr lang="en-US" dirty="0"/>
               <a:t> Server / </a:t>
             </a:r>
             <a:r>
-              <a:rPr lang="en-US" dirty="0" err="1" smtClean="0"/>
+              <a:rPr lang="en-US" dirty="0" err="1"/>
               <a:t>NuGet</a:t>
             </a:r>
             <a:r>
-              <a:rPr lang="en-US" dirty="0" smtClean="0"/>
+              <a:rPr lang="en-US" dirty="0"/>
               <a:t> Gallery / </a:t>
             </a:r>
             <a:r>
-              <a:rPr lang="en-US" dirty="0" err="1" smtClean="0"/>
+              <a:rPr lang="en-US" dirty="0" err="1"/>
               <a:t>Artifactory</a:t>
             </a:r>
-            <a:endParaRPr lang="en-US" dirty="0" smtClean="0"/>
-          </a:p>
-          <a:p>
-            <a:r>
-              <a:rPr lang="en-US" dirty="0" smtClean="0"/>
+            <a:endParaRPr lang="en-US" dirty="0"/>
+          </a:p>
+          <a:p>
+            <a:r>
+              <a:rPr lang="en-US" dirty="0"/>
               <a:t>Build</a:t>
             </a:r>
           </a:p>
           <a:p>
             <a:r>
-              <a:rPr lang="en-US" dirty="0" smtClean="0"/>
+              <a:rPr lang="en-US" dirty="0"/>
               <a:t>Create </a:t>
             </a:r>
             <a:r>
-              <a:rPr lang="en-US" dirty="0" err="1" smtClean="0"/>
+              <a:rPr lang="en-US" dirty="0" err="1"/>
               <a:t>NuSpec</a:t>
             </a:r>
-            <a:endParaRPr lang="en-US" dirty="0" smtClean="0"/>
+            <a:endParaRPr lang="en-US" dirty="0"/>
           </a:p>
           <a:p>
             <a:pPr lvl="1"/>
             <a:r>
               <a:rPr lang="en-US" dirty="0" err="1"/>
-              <a:t>n</a:t>
-            </a:r>
-            <a:r>
-              <a:rPr lang="en-US" dirty="0" err="1" smtClean="0"/>
-              <a:t>uget</a:t>
-            </a:r>
-            <a:r>
-              <a:rPr lang="en-US" dirty="0" smtClean="0"/>
+              <a:t>nuget</a:t>
+            </a:r>
+            <a:r>
+              <a:rPr lang="en-US" dirty="0"/>
               <a:t> spec</a:t>
             </a:r>
           </a:p>
           <a:p>
             <a:pPr lvl="1"/>
             <a:r>
-              <a:rPr lang="en-US" dirty="0" err="1" smtClean="0"/>
+              <a:rPr lang="en-US" dirty="0" err="1"/>
               <a:t>nuget</a:t>
             </a:r>
             <a:r>
-              <a:rPr lang="en-US" dirty="0" smtClean="0"/>
+              <a:rPr lang="en-US" dirty="0"/>
               <a:t> pack</a:t>
             </a:r>
-            <a:endParaRPr lang="en-US" dirty="0"/>
-          </a:p>
-          <a:p>
-            <a:r>
-              <a:rPr lang="en-US" dirty="0" smtClean="0"/>
+          </a:p>
+          <a:p>
+            <a:r>
+              <a:rPr lang="en-US" dirty="0"/>
               <a:t>Package</a:t>
             </a:r>
           </a:p>
           <a:p>
             <a:r>
-              <a:rPr lang="en-US" dirty="0" smtClean="0"/>
-              <a:t>For </a:t>
-            </a:r>
-            <a:r>
-              <a:rPr lang="en-US" dirty="0"/>
-              <a:t>more information: </a:t>
-            </a:r>
-            <a:endParaRPr lang="en-US" dirty="0" smtClean="0"/>
+              <a:rPr lang="en-US" dirty="0"/>
+              <a:t>For more information: </a:t>
+            </a:r>
           </a:p>
           <a:p>
             <a:pPr lvl="1"/>
             <a:r>
-              <a:rPr lang="en-US" dirty="0" smtClean="0"/>
-              <a:t>http</a:t>
-            </a:r>
-            <a:r>
-              <a:rPr lang="en-US" dirty="0"/>
-              <a:t>://docs.nuget.org/create/creating-and-publishing-a-package</a:t>
-            </a:r>
-            <a:endParaRPr lang="en-US" dirty="0"/>
+              <a:rPr lang="en-US" dirty="0"/>
+              <a:t>http://docs.nuget.org/create/creating-and-publishing-a-package</a:t>
+            </a:r>
           </a:p>
         </p:txBody>
       </p:sp>
@@ -5035,7 +4921,7 @@
           <a:lstStyle/>
           <a:p>
             <a:r>
-              <a:rPr lang="en-US" dirty="0" smtClean="0"/>
+              <a:rPr lang="en-US" dirty="0"/>
               <a:t>Questions</a:t>
             </a:r>
             <a:endParaRPr lang="en-US" b="1" dirty="0"/>
@@ -5065,10 +4951,9 @@
           <a:lstStyle/>
           <a:p>
             <a:r>
-              <a:rPr lang="en-US" dirty="0" smtClean="0"/>
+              <a:rPr lang="en-US" dirty="0"/>
               <a:t>Jason@vanbrackel.net</a:t>
             </a:r>
-            <a:endParaRPr lang="en-US" dirty="0"/>
           </a:p>
         </p:txBody>
       </p:sp>
@@ -5095,10 +4980,9 @@
           <a:lstStyle/>
           <a:p>
             <a:r>
-              <a:rPr lang="en-US" dirty="0" smtClean="0"/>
+              <a:rPr lang="en-US" dirty="0"/>
               <a:t>http://www.github.com/jasonvanbrackel</a:t>
             </a:r>
-            <a:endParaRPr lang="en-US" dirty="0"/>
           </a:p>
         </p:txBody>
       </p:sp>
@@ -5154,10 +5038,9 @@
           <a:lstStyle/>
           <a:p>
             <a:r>
-              <a:rPr lang="en-US" dirty="0" smtClean="0"/>
+              <a:rPr lang="en-US" dirty="0"/>
               <a:t>jvanbrackel@apprenda.com</a:t>
             </a:r>
-            <a:endParaRPr lang="en-US" dirty="0"/>
           </a:p>
         </p:txBody>
       </p:sp>
@@ -5261,10 +5144,9 @@
           <a:lstStyle/>
           <a:p>
             <a:r>
-              <a:rPr lang="en-US" dirty="0" smtClean="0"/>
+              <a:rPr lang="en-US" dirty="0"/>
               <a:t>Who am I?</a:t>
             </a:r>
-            <a:endParaRPr lang="en-US" dirty="0"/>
           </a:p>
         </p:txBody>
       </p:sp>
@@ -5332,10 +5214,9 @@
           <a:lstStyle/>
           <a:p>
             <a:r>
-              <a:rPr lang="en-US" dirty="0" smtClean="0"/>
+              <a:rPr lang="en-US" dirty="0"/>
               <a:t>I’m Jason I work at</a:t>
             </a:r>
-            <a:endParaRPr lang="en-US" dirty="0"/>
           </a:p>
         </p:txBody>
       </p:sp>
@@ -5362,10 +5243,9 @@
           <a:lstStyle/>
           <a:p>
             <a:r>
-              <a:rPr lang="en-US" dirty="0" smtClean="0"/>
+              <a:rPr lang="en-US" dirty="0"/>
               <a:t>Jason@vanbrackel.net</a:t>
             </a:r>
-            <a:endParaRPr lang="en-US" dirty="0"/>
           </a:p>
         </p:txBody>
       </p:sp>
@@ -5392,10 +5272,9 @@
           <a:lstStyle/>
           <a:p>
             <a:r>
-              <a:rPr lang="en-US" dirty="0" smtClean="0"/>
+              <a:rPr lang="en-US" dirty="0"/>
               <a:t>http://www.github.com/jasonvanbrackel</a:t>
             </a:r>
-            <a:endParaRPr lang="en-US" dirty="0"/>
           </a:p>
         </p:txBody>
       </p:sp>
@@ -5428,6 +5307,36 @@
           </a:p>
         </p:txBody>
       </p:sp>
+      <p:pic>
+        <p:nvPicPr>
+          <p:cNvPr id="3" name="Picture 2"/>
+          <p:cNvPicPr>
+            <a:picLocks noChangeAspect="1"/>
+          </p:cNvPicPr>
+          <p:nvPr/>
+        </p:nvPicPr>
+        <p:blipFill>
+          <a:blip r:embed="rId3">
+            <a:extLst>
+              <a:ext uri="{28A0092B-C50C-407E-A947-70E740481C1C}">
+                <a14:useLocalDpi xmlns:a14="http://schemas.microsoft.com/office/drawing/2010/main" val="0"/>
+              </a:ext>
+            </a:extLst>
+          </a:blip>
+          <a:stretch>
+            <a:fillRect/>
+          </a:stretch>
+        </p:blipFill>
+        <p:spPr>
+          <a:xfrm>
+            <a:off x="7242819" y="914400"/>
+            <a:ext cx="3423595" cy="4006335"/>
+          </a:xfrm>
+          <a:prstGeom prst="rect">
+            <a:avLst/>
+          </a:prstGeom>
+        </p:spPr>
+      </p:pic>
     </p:spTree>
     <p:extLst>
       <p:ext uri="{BB962C8B-B14F-4D97-AF65-F5344CB8AC3E}">
@@ -5450,13 +5359,6 @@
       </p:transition>
     </mc:Fallback>
   </mc:AlternateContent>
-  <p:timing>
-    <p:tnLst>
-      <p:par>
-        <p:cTn id="1" dur="indefinite" restart="never" nodeType="tmRoot"/>
-      </p:par>
-    </p:tnLst>
-  </p:timing>
 </p:sld>
 </file>
 
@@ -5493,10 +5395,9 @@
           <a:lstStyle/>
           <a:p>
             <a:r>
-              <a:rPr lang="en-US" dirty="0" smtClean="0"/>
+              <a:rPr lang="en-US" dirty="0"/>
               <a:t>Goals Today</a:t>
             </a:r>
-            <a:endParaRPr lang="en-US" dirty="0"/>
           </a:p>
         </p:txBody>
       </p:sp>
@@ -5516,44 +5417,39 @@
           <a:lstStyle/>
           <a:p>
             <a:r>
-              <a:rPr lang="en-US" dirty="0" smtClean="0"/>
+              <a:rPr lang="en-US" dirty="0"/>
               <a:t>Introduce you to Continuous Integration</a:t>
             </a:r>
           </a:p>
           <a:p>
             <a:r>
-              <a:rPr lang="en-US" dirty="0" smtClean="0"/>
+              <a:rPr lang="en-US" dirty="0"/>
               <a:t>Introduce you to Selenium</a:t>
             </a:r>
           </a:p>
           <a:p>
             <a:r>
-              <a:rPr lang="en-US" dirty="0" smtClean="0"/>
+              <a:rPr lang="en-US" dirty="0"/>
               <a:t>Introduce you to Jenkins</a:t>
             </a:r>
           </a:p>
           <a:p>
             <a:r>
-              <a:rPr lang="en-US" dirty="0" smtClean="0"/>
+              <a:rPr lang="en-US" dirty="0"/>
               <a:t>Demo a working CI environment</a:t>
             </a:r>
           </a:p>
           <a:p>
             <a:r>
-              <a:rPr lang="en-US" dirty="0" smtClean="0"/>
-              <a:t>Discuss Continuous </a:t>
-            </a:r>
-            <a:r>
-              <a:rPr lang="en-US" dirty="0" smtClean="0"/>
-              <a:t>Deployment</a:t>
-            </a:r>
-          </a:p>
-          <a:p>
-            <a:r>
-              <a:rPr lang="en-US" dirty="0" smtClean="0"/>
+              <a:rPr lang="en-US" dirty="0"/>
+              <a:t>Discuss Continuous Deployment</a:t>
+            </a:r>
+          </a:p>
+          <a:p>
+            <a:r>
+              <a:rPr lang="en-US" dirty="0"/>
               <a:t>Discuss Packaging</a:t>
             </a:r>
-            <a:endParaRPr lang="en-US" dirty="0"/>
           </a:p>
         </p:txBody>
       </p:sp>
@@ -5579,13 +5475,6 @@
       </p:transition>
     </mc:Fallback>
   </mc:AlternateContent>
-  <p:timing>
-    <p:tnLst>
-      <p:par>
-        <p:cTn id="1" dur="indefinite" restart="never" nodeType="tmRoot"/>
-      </p:par>
-    </p:tnLst>
-  </p:timing>
 </p:sld>
 </file>
 
@@ -5627,10 +5516,9 @@
           <a:lstStyle/>
           <a:p>
             <a:r>
-              <a:rPr lang="en-US" dirty="0" smtClean="0"/>
+              <a:rPr lang="en-US" dirty="0"/>
               <a:t>Continuous Integration</a:t>
             </a:r>
-            <a:endParaRPr lang="en-US" dirty="0"/>
           </a:p>
         </p:txBody>
       </p:sp>
@@ -5655,18 +5543,9 @@
           <a:lstStyle/>
           <a:p>
             <a:r>
-              <a:rPr lang="en-US" dirty="0" smtClean="0"/>
-              <a:t>The </a:t>
-            </a:r>
-            <a:r>
-              <a:rPr lang="en-US" dirty="0"/>
-              <a:t>practice of frequently integrating one's new or changed code with the existing </a:t>
-            </a:r>
-            <a:r>
-              <a:rPr lang="en-US" dirty="0" smtClean="0"/>
-              <a:t>code.</a:t>
-            </a:r>
-            <a:endParaRPr lang="en-US" dirty="0"/>
+              <a:rPr lang="en-US" dirty="0"/>
+              <a:t>The practice of frequently integrating one's new or changed code with the existing code.</a:t>
+            </a:r>
           </a:p>
         </p:txBody>
       </p:sp>
@@ -5692,13 +5571,6 @@
       </p:transition>
     </mc:Fallback>
   </mc:AlternateContent>
-  <p:timing>
-    <p:tnLst>
-      <p:par>
-        <p:cTn id="1" dur="indefinite" restart="never" nodeType="tmRoot"/>
-      </p:par>
-    </p:tnLst>
-  </p:timing>
 </p:sld>
 </file>
 
@@ -5735,10 +5607,9 @@
           <a:lstStyle/>
           <a:p>
             <a:r>
-              <a:rPr lang="en-US" dirty="0" smtClean="0"/>
+              <a:rPr lang="en-US" dirty="0"/>
               <a:t>Continuous Integration</a:t>
             </a:r>
-            <a:endParaRPr lang="en-US" dirty="0"/>
           </a:p>
         </p:txBody>
       </p:sp>
@@ -5816,13 +5687,6 @@
       </p:transition>
     </mc:Fallback>
   </mc:AlternateContent>
-  <p:timing>
-    <p:tnLst>
-      <p:par>
-        <p:cTn id="1" dur="indefinite" restart="never" nodeType="tmRoot"/>
-      </p:par>
-    </p:tnLst>
-  </p:timing>
 </p:sld>
 </file>
 
@@ -5859,10 +5723,9 @@
           <a:lstStyle/>
           <a:p>
             <a:r>
-              <a:rPr lang="en-US" dirty="0" smtClean="0"/>
+              <a:rPr lang="en-US" dirty="0"/>
               <a:t>Continuous Integration</a:t>
             </a:r>
-            <a:endParaRPr lang="en-US" dirty="0"/>
           </a:p>
         </p:txBody>
       </p:sp>
@@ -5887,10 +5750,9 @@
           <a:lstStyle/>
           <a:p>
             <a:r>
-              <a:rPr lang="en-US" dirty="0" smtClean="0"/>
+              <a:rPr lang="en-US" dirty="0"/>
               <a:t>Principles</a:t>
             </a:r>
-            <a:endParaRPr lang="en-US" dirty="0"/>
           </a:p>
         </p:txBody>
       </p:sp>
@@ -5912,7 +5774,7 @@
         </p:spPr>
         <p:txBody>
           <a:bodyPr>
-            <a:normAutofit fontScale="62500" lnSpcReduction="20000"/>
+            <a:normAutofit/>
           </a:bodyPr>
           <a:lstStyle/>
           <a:p>
@@ -5924,7 +5786,7 @@
           <a:p>
             <a:r>
               <a:rPr lang="en-US" dirty="0"/>
-              <a:t>Automate the Build</a:t>
+              <a:t>Automate, Automate, Automate</a:t>
             </a:r>
           </a:p>
           <a:p>
@@ -5936,51 +5798,25 @@
           <a:p>
             <a:r>
               <a:rPr lang="en-US" dirty="0"/>
-              <a:t>Everyone Commits To the Mainline Every Day</a:t>
-            </a:r>
-          </a:p>
-          <a:p>
-            <a:r>
-              <a:rPr lang="en-US" dirty="0"/>
-              <a:t>Every Commit Should Build the Mainline on an Integration Machine</a:t>
-            </a:r>
-          </a:p>
-          <a:p>
-            <a:r>
-              <a:rPr lang="en-US" dirty="0"/>
               <a:t>Keep the Build Fast</a:t>
             </a:r>
           </a:p>
           <a:p>
             <a:r>
               <a:rPr lang="en-US" dirty="0"/>
-              <a:t>Test in a Clone of the Production Environment</a:t>
-            </a:r>
-          </a:p>
-          <a:p>
-            <a:r>
-              <a:rPr lang="en-US" dirty="0"/>
-              <a:t>Make it Easy for Anyone to Get the Latest Executable</a:t>
-            </a:r>
-          </a:p>
-          <a:p>
-            <a:r>
-              <a:rPr lang="en-US" dirty="0"/>
-              <a:t>Everyone can see what's happening</a:t>
-            </a:r>
-          </a:p>
-          <a:p>
-            <a:r>
-              <a:rPr lang="en-US" dirty="0"/>
-              <a:t>Automate Deployment</a:t>
-            </a:r>
-            <a:br>
-              <a:rPr lang="en-US" dirty="0"/>
-            </a:br>
-            <a:r>
-              <a:rPr lang="en-US" dirty="0"/>
-              <a:t/>
-            </a:r>
+              <a:t>Test in a Clone of the Production Environment if possible</a:t>
+            </a:r>
+          </a:p>
+          <a:p>
+            <a:r>
+              <a:rPr lang="en-US" dirty="0"/>
+              <a:t>Make it Easy for Anyone to get the Latest and Greatest</a:t>
+            </a:r>
+          </a:p>
+          <a:p>
+            <a:pPr marL="0" indent="0">
+              <a:buNone/>
+            </a:pPr>
             <a:br>
               <a:rPr lang="en-US" dirty="0"/>
             </a:br>
@@ -6016,13 +5852,6 @@
       </p:transition>
     </mc:Fallback>
   </mc:AlternateContent>
-  <p:timing>
-    <p:tnLst>
-      <p:par>
-        <p:cTn id="1" dur="indefinite" restart="never" nodeType="tmRoot"/>
-      </p:par>
-    </p:tnLst>
-  </p:timing>
 </p:sld>
 </file>
 
@@ -6059,10 +5888,9 @@
           <a:lstStyle/>
           <a:p>
             <a:r>
-              <a:rPr lang="en-US" dirty="0" smtClean="0"/>
+              <a:rPr lang="en-US" dirty="0"/>
               <a:t>Continuous Integration</a:t>
             </a:r>
-            <a:endParaRPr lang="en-US" dirty="0"/>
           </a:p>
         </p:txBody>
       </p:sp>
@@ -6087,10 +5915,9 @@
           <a:lstStyle/>
           <a:p>
             <a:r>
-              <a:rPr lang="en-US" dirty="0" smtClean="0"/>
+              <a:rPr lang="en-US" dirty="0"/>
               <a:t>Tools</a:t>
             </a:r>
-            <a:endParaRPr lang="en-US" dirty="0"/>
           </a:p>
         </p:txBody>
       </p:sp>
@@ -6148,42 +5975,25 @@
             </a:r>
             <a:r>
               <a:rPr lang="en-US" dirty="0"/>
-              <a:t>, .</a:t>
-            </a:r>
-            <a:r>
-              <a:rPr lang="en-US" dirty="0" smtClean="0"/>
-              <a:t>bat/.</a:t>
-            </a:r>
-            <a:r>
-              <a:rPr lang="en-US" dirty="0" err="1" smtClean="0"/>
+              <a:t>, .bat/.</a:t>
+            </a:r>
+            <a:r>
+              <a:rPr lang="en-US" dirty="0" err="1"/>
               <a:t>cmd</a:t>
             </a:r>
             <a:r>
-              <a:rPr lang="en-US" dirty="0" smtClean="0"/>
+              <a:rPr lang="en-US" dirty="0"/>
               <a:t>)</a:t>
             </a:r>
-            <a:endParaRPr lang="en-US" dirty="0"/>
-          </a:p>
-          <a:p>
-            <a:r>
-              <a:rPr lang="en-US" dirty="0" smtClean="0"/>
-              <a:t>Automate the </a:t>
-            </a:r>
-            <a:r>
-              <a:rPr lang="en-US" dirty="0" smtClean="0"/>
-              <a:t>Testing (</a:t>
-            </a:r>
-            <a:r>
-              <a:rPr lang="en-US" dirty="0" err="1" smtClean="0"/>
-              <a:t>Nunit</a:t>
-            </a:r>
-            <a:r>
-              <a:rPr lang="en-US" dirty="0"/>
-              <a:t>, </a:t>
+          </a:p>
+          <a:p>
+            <a:r>
+              <a:rPr lang="en-US" dirty="0"/>
+              <a:t>Automate the Testing (</a:t>
             </a:r>
             <a:r>
               <a:rPr lang="en-US" dirty="0" err="1"/>
-              <a:t>Machine.Specifications</a:t>
+              <a:t>XUnit</a:t>
             </a:r>
             <a:r>
               <a:rPr lang="en-US" dirty="0"/>
@@ -6194,40 +6004,39 @@
               <a:t>SpecFlow</a:t>
             </a:r>
             <a:r>
-              <a:rPr lang="en-US" dirty="0" smtClean="0"/>
+              <a:rPr lang="en-US" dirty="0"/>
+              <a:t>, Selenium)</a:t>
+            </a:r>
+          </a:p>
+          <a:p>
+            <a:r>
+              <a:rPr lang="en-US" dirty="0"/>
+              <a:t>Continuous Delivery (</a:t>
+            </a:r>
+            <a:r>
+              <a:rPr lang="en-US" dirty="0" err="1"/>
+              <a:t>MSDeploy</a:t>
+            </a:r>
+            <a:r>
+              <a:rPr lang="en-US" dirty="0"/>
+              <a:t>, </a:t>
+            </a:r>
+            <a:r>
+              <a:rPr lang="en-US" dirty="0" err="1"/>
+              <a:t>NuGet</a:t>
+            </a:r>
+            <a:r>
+              <a:rPr lang="en-US" dirty="0"/>
+              <a:t>, PaaS, </a:t>
+            </a:r>
+            <a:r>
+              <a:rPr lang="en-US" dirty="0" err="1"/>
+              <a:t>AppVeyor</a:t>
+            </a:r>
+            <a:r>
+              <a:rPr lang="en-US" dirty="0"/>
               <a:t>)</a:t>
             </a:r>
-          </a:p>
-          <a:p>
-            <a:r>
-              <a:rPr lang="en-US" dirty="0" smtClean="0"/>
-              <a:t>Continuous Delivery (</a:t>
-            </a:r>
-            <a:r>
-              <a:rPr lang="en-US" dirty="0" err="1" smtClean="0"/>
-              <a:t>MSDeploy</a:t>
-            </a:r>
-            <a:r>
-              <a:rPr lang="en-US" dirty="0" smtClean="0"/>
-              <a:t>, </a:t>
-            </a:r>
-            <a:r>
-              <a:rPr lang="en-US" dirty="0" err="1" smtClean="0"/>
-              <a:t>NuGet</a:t>
-            </a:r>
-            <a:r>
-              <a:rPr lang="en-US" dirty="0" smtClean="0"/>
-              <a:t>, PaaS, </a:t>
-            </a:r>
-            <a:r>
-              <a:rPr lang="en-US" dirty="0" err="1" smtClean="0"/>
-              <a:t>AppVeyor</a:t>
-            </a:r>
-            <a:r>
-              <a:rPr lang="en-US" dirty="0" smtClean="0"/>
-              <a:t>)</a:t>
-            </a:r>
-            <a:endParaRPr lang="en-US" dirty="0"/>
           </a:p>
           <a:p>
             <a:endParaRPr lang="en-US" dirty="0"/>
@@ -6297,10 +6106,9 @@
           <a:lstStyle/>
           <a:p>
             <a:r>
-              <a:rPr lang="en-US" dirty="0" smtClean="0"/>
+              <a:rPr lang="en-US" dirty="0"/>
               <a:t>Selenium </a:t>
             </a:r>
-            <a:endParaRPr lang="en-US" dirty="0"/>
           </a:p>
         </p:txBody>
       </p:sp>
@@ -6326,19 +6134,14 @@
           <a:p>
             <a:r>
               <a:rPr lang="en-US" dirty="0"/>
-              <a:t>Selenium Automates Browsers, That’s It</a:t>
-            </a:r>
-            <a:r>
-              <a:rPr lang="en-US" dirty="0" smtClean="0"/>
-              <a:t>!</a:t>
-            </a:r>
-          </a:p>
-          <a:p>
-            <a:r>
-              <a:rPr lang="en-US" dirty="0" smtClean="0"/>
+              <a:t>Selenium Automates Browsers, That’s It!</a:t>
+            </a:r>
+          </a:p>
+          <a:p>
+            <a:r>
+              <a:rPr lang="en-US" dirty="0"/>
               <a:t>http://seleniumhq.org</a:t>
             </a:r>
-            <a:endParaRPr lang="en-US" dirty="0"/>
           </a:p>
         </p:txBody>
       </p:sp>
@@ -6400,7 +6203,7 @@
           <a:lstStyle/>
           <a:p>
             <a:r>
-              <a:rPr lang="en-US" dirty="0" err="1" smtClean="0"/>
+              <a:rPr lang="en-US" dirty="0" err="1"/>
               <a:t>Selenuim</a:t>
             </a:r>
             <a:endParaRPr lang="en-US" dirty="0"/>
@@ -6428,10 +6231,9 @@
           <a:lstStyle/>
           <a:p>
             <a:r>
-              <a:rPr lang="en-US" dirty="0" smtClean="0"/>
+              <a:rPr lang="en-US" dirty="0"/>
               <a:t>Features</a:t>
             </a:r>
-            <a:endParaRPr lang="en-US" dirty="0"/>
           </a:p>
         </p:txBody>
       </p:sp>
@@ -6458,26 +6260,32 @@
           <a:lstStyle/>
           <a:p>
             <a:r>
-              <a:rPr lang="en-US" dirty="0" smtClean="0"/>
+              <a:rPr lang="en-US" dirty="0"/>
               <a:t>It automates browsers</a:t>
             </a:r>
           </a:p>
           <a:p>
             <a:r>
-              <a:rPr lang="en-US" dirty="0" smtClean="0"/>
+              <a:rPr lang="en-US" dirty="0"/>
               <a:t>Simple Object Oriented API</a:t>
             </a:r>
           </a:p>
           <a:p>
             <a:r>
-              <a:rPr lang="en-US" dirty="0" smtClean="0"/>
+              <a:rPr lang="en-US" dirty="0"/>
               <a:t>Integrates with pretty much any browser you can think of.</a:t>
             </a:r>
           </a:p>
           <a:p>
             <a:r>
-              <a:rPr lang="en-US" dirty="0" smtClean="0"/>
+              <a:rPr lang="en-US" dirty="0"/>
               <a:t>Open  Source</a:t>
+            </a:r>
+          </a:p>
+          <a:p>
+            <a:r>
+              <a:rPr lang="en-US" dirty="0"/>
+              <a:t>Let’s take a look</a:t>
             </a:r>
           </a:p>
         </p:txBody>

</xml_diff>